<commit_message>
Created safety workshop. Added more folders for better organization
</commit_message>
<xml_diff>
--- a/ECSE/Workshop-1/workshop1.pptx
+++ b/ECSE/Workshop-1/workshop1.pptx
@@ -6,6 +6,9 @@
   </p:sldMasterIdLst>
   <p:sldIdLst>
     <p:sldId id="256" r:id="rId2"/>
+    <p:sldId id="257" r:id="rId3"/>
+    <p:sldId id="258" r:id="rId4"/>
+    <p:sldId id="259" r:id="rId5"/>
   </p:sldIdLst>
   <p:sldSz cx="12192000" cy="6858000"/>
   <p:notesSz cx="6858000" cy="9144000"/>
@@ -104,6 +107,11 @@
       </a:defRPr>
     </a:lvl9pPr>
   </p:defaultTextStyle>
+  <p:extLst>
+    <p:ext uri="{EFAFB233-063F-42B5-8137-9DF3F51BA10A}">
+      <p15:sldGuideLst xmlns:p15="http://schemas.microsoft.com/office/powerpoint/2012/main"/>
+    </p:ext>
+  </p:extLst>
 </p:presentation>
 </file>
 
@@ -3358,15 +3366,27 @@
             <p:ph type="ctrTitle"/>
           </p:nvPr>
         </p:nvSpPr>
-        <p:spPr/>
-        <p:txBody>
-          <a:bodyPr/>
-          <a:lstStyle/>
-          <a:p>
-            <a:r>
-              <a:rPr lang="en-CA"/>
-              <a:t>Workshop 1</a:t>
-            </a:r>
+        <p:spPr>
+          <a:xfrm>
+            <a:off x="1524000" y="1122363"/>
+            <a:ext cx="9144000" cy="3052072"/>
+          </a:xfrm>
+        </p:spPr>
+        <p:txBody>
+          <a:bodyPr>
+            <a:normAutofit fontScale="90000"/>
+          </a:bodyPr>
+          <a:lstStyle/>
+          <a:p>
+            <a:r>
+              <a:rPr lang="en-CA" dirty="0"/>
+              <a:t>Workshop 1:</a:t>
+            </a:r>
+            <a:r>
+              <a:rPr lang="en-US" dirty="0"/>
+              <a:t>Workshop 1: Using Arduino: Electronic components. Resistors, capacitors, diodes, inductors</a:t>
+            </a:r>
+            <a:endParaRPr lang="en-CA" dirty="0"/>
           </a:p>
         </p:txBody>
       </p:sp>
@@ -3386,12 +3406,17 @@
             <p:ph type="subTitle" idx="1"/>
           </p:nvPr>
         </p:nvSpPr>
-        <p:spPr/>
-        <p:txBody>
-          <a:bodyPr/>
-          <a:lstStyle/>
-          <a:p>
-            <a:endParaRPr lang="en-CA"/>
+        <p:spPr>
+          <a:xfrm>
+            <a:off x="1524000" y="4320208"/>
+            <a:ext cx="9144000" cy="937591"/>
+          </a:xfrm>
+        </p:spPr>
+        <p:txBody>
+          <a:bodyPr/>
+          <a:lstStyle/>
+          <a:p>
+            <a:endParaRPr lang="en-CA" dirty="0"/>
           </a:p>
         </p:txBody>
       </p:sp>
@@ -3399,6 +3424,360 @@
     <p:extLst>
       <p:ext uri="{BB962C8B-B14F-4D97-AF65-F5344CB8AC3E}">
         <p14:creationId xmlns:p14="http://schemas.microsoft.com/office/powerpoint/2010/main" val="3510745337"/>
+      </p:ext>
+    </p:extLst>
+  </p:cSld>
+  <p:clrMapOvr>
+    <a:masterClrMapping/>
+  </p:clrMapOvr>
+</p:sld>
+</file>
+
+<file path=ppt/slides/slide2.xml><?xml version="1.0" encoding="utf-8"?>
+<p:sld xmlns:a="http://schemas.openxmlformats.org/drawingml/2006/main" xmlns:r="http://schemas.openxmlformats.org/officeDocument/2006/relationships" xmlns:p="http://schemas.openxmlformats.org/presentationml/2006/main">
+  <p:cSld>
+    <p:spTree>
+      <p:nvGrpSpPr>
+        <p:cNvPr id="1" name=""/>
+        <p:cNvGrpSpPr/>
+        <p:nvPr/>
+      </p:nvGrpSpPr>
+      <p:grpSpPr>
+        <a:xfrm>
+          <a:off x="0" y="0"/>
+          <a:ext cx="0" cy="0"/>
+          <a:chOff x="0" y="0"/>
+          <a:chExt cx="0" cy="0"/>
+        </a:xfrm>
+      </p:grpSpPr>
+      <p:sp>
+        <p:nvSpPr>
+          <p:cNvPr id="2" name="Title 1">
+            <a:extLst>
+              <a:ext uri="{FF2B5EF4-FFF2-40B4-BE49-F238E27FC236}">
+                <a16:creationId xmlns:a16="http://schemas.microsoft.com/office/drawing/2014/main" id="{DA03435D-F04F-4C0D-989C-E4CCB13D1124}"/>
+              </a:ext>
+            </a:extLst>
+          </p:cNvPr>
+          <p:cNvSpPr>
+            <a:spLocks noGrp="1"/>
+          </p:cNvSpPr>
+          <p:nvPr>
+            <p:ph type="title"/>
+          </p:nvPr>
+        </p:nvSpPr>
+        <p:spPr/>
+        <p:txBody>
+          <a:bodyPr/>
+          <a:lstStyle/>
+          <a:p>
+            <a:r>
+              <a:rPr lang="en-CA" dirty="0"/>
+              <a:t>Overview:</a:t>
+            </a:r>
+          </a:p>
+        </p:txBody>
+      </p:sp>
+      <p:sp>
+        <p:nvSpPr>
+          <p:cNvPr id="3" name="Content Placeholder 2">
+            <a:extLst>
+              <a:ext uri="{FF2B5EF4-FFF2-40B4-BE49-F238E27FC236}">
+                <a16:creationId xmlns:a16="http://schemas.microsoft.com/office/drawing/2014/main" id="{BD1B29A2-D9FF-43C1-9FEB-DE6440A18B42}"/>
+              </a:ext>
+            </a:extLst>
+          </p:cNvPr>
+          <p:cNvSpPr>
+            <a:spLocks noGrp="1"/>
+          </p:cNvSpPr>
+          <p:nvPr>
+            <p:ph idx="1"/>
+          </p:nvPr>
+        </p:nvSpPr>
+        <p:spPr/>
+        <p:txBody>
+          <a:bodyPr/>
+          <a:lstStyle/>
+          <a:p>
+            <a:r>
+              <a:rPr lang="en-US" dirty="0"/>
+              <a:t>- Learning outcome: Basics of circuit analysis. Basic Safety when working with electronics.</a:t>
+            </a:r>
+          </a:p>
+          <a:p>
+            <a:r>
+              <a:rPr lang="en-US" dirty="0"/>
+              <a:t>- Project: Timer circuit using capacitors and transistors. LED blinks at calculated interval time.</a:t>
+            </a:r>
+          </a:p>
+          <a:p>
+            <a:r>
+              <a:rPr lang="en-US" dirty="0"/>
+              <a:t>- Basics of circuit analysis: 30 min</a:t>
+            </a:r>
+          </a:p>
+          <a:p>
+            <a:endParaRPr lang="en-CA" dirty="0"/>
+          </a:p>
+        </p:txBody>
+      </p:sp>
+    </p:spTree>
+    <p:extLst>
+      <p:ext uri="{BB962C8B-B14F-4D97-AF65-F5344CB8AC3E}">
+        <p14:creationId xmlns:p14="http://schemas.microsoft.com/office/powerpoint/2010/main" val="651143351"/>
+      </p:ext>
+    </p:extLst>
+  </p:cSld>
+  <p:clrMapOvr>
+    <a:masterClrMapping/>
+  </p:clrMapOvr>
+</p:sld>
+</file>
+
+<file path=ppt/slides/slide3.xml><?xml version="1.0" encoding="utf-8"?>
+<p:sld xmlns:a="http://schemas.openxmlformats.org/drawingml/2006/main" xmlns:r="http://schemas.openxmlformats.org/officeDocument/2006/relationships" xmlns:p="http://schemas.openxmlformats.org/presentationml/2006/main">
+  <p:cSld>
+    <p:spTree>
+      <p:nvGrpSpPr>
+        <p:cNvPr id="1" name=""/>
+        <p:cNvGrpSpPr/>
+        <p:nvPr/>
+      </p:nvGrpSpPr>
+      <p:grpSpPr>
+        <a:xfrm>
+          <a:off x="0" y="0"/>
+          <a:ext cx="0" cy="0"/>
+          <a:chOff x="0" y="0"/>
+          <a:chExt cx="0" cy="0"/>
+        </a:xfrm>
+      </p:grpSpPr>
+      <p:sp>
+        <p:nvSpPr>
+          <p:cNvPr id="2" name="Title 1">
+            <a:extLst>
+              <a:ext uri="{FF2B5EF4-FFF2-40B4-BE49-F238E27FC236}">
+                <a16:creationId xmlns:a16="http://schemas.microsoft.com/office/drawing/2014/main" id="{F20C2503-84A2-4F21-9DB3-15889019898E}"/>
+              </a:ext>
+            </a:extLst>
+          </p:cNvPr>
+          <p:cNvSpPr>
+            <a:spLocks noGrp="1"/>
+          </p:cNvSpPr>
+          <p:nvPr>
+            <p:ph type="title"/>
+          </p:nvPr>
+        </p:nvSpPr>
+        <p:spPr/>
+        <p:txBody>
+          <a:bodyPr/>
+          <a:lstStyle/>
+          <a:p>
+            <a:r>
+              <a:rPr lang="en-US" dirty="0"/>
+              <a:t>Basics of circuit analysis</a:t>
+            </a:r>
+            <a:endParaRPr lang="en-CA" dirty="0"/>
+          </a:p>
+        </p:txBody>
+      </p:sp>
+      <p:sp>
+        <p:nvSpPr>
+          <p:cNvPr id="3" name="Content Placeholder 2">
+            <a:extLst>
+              <a:ext uri="{FF2B5EF4-FFF2-40B4-BE49-F238E27FC236}">
+                <a16:creationId xmlns:a16="http://schemas.microsoft.com/office/drawing/2014/main" id="{DC76183D-B9E8-47AD-9873-66F08644F81E}"/>
+              </a:ext>
+            </a:extLst>
+          </p:cNvPr>
+          <p:cNvSpPr>
+            <a:spLocks noGrp="1"/>
+          </p:cNvSpPr>
+          <p:nvPr>
+            <p:ph idx="1"/>
+          </p:nvPr>
+        </p:nvSpPr>
+        <p:spPr/>
+        <p:txBody>
+          <a:bodyPr/>
+          <a:lstStyle/>
+          <a:p>
+            <a:r>
+              <a:rPr lang="en-CA" dirty="0"/>
+              <a:t>Resistors:</a:t>
+            </a:r>
+          </a:p>
+          <a:p>
+            <a:pPr lvl="1"/>
+            <a:r>
+              <a:rPr lang="en-CA" dirty="0"/>
+              <a:t>Series: Req = R1+R2</a:t>
+            </a:r>
+          </a:p>
+          <a:p>
+            <a:pPr lvl="1"/>
+            <a:r>
+              <a:rPr lang="en-CA" dirty="0"/>
+              <a:t>Parallel: Req = 1/(1/R1 + 1/R2)</a:t>
+            </a:r>
+          </a:p>
+          <a:p>
+            <a:r>
+              <a:rPr lang="en-CA" dirty="0"/>
+              <a:t>Capacitors:</a:t>
+            </a:r>
+          </a:p>
+          <a:p>
+            <a:pPr lvl="1"/>
+            <a:r>
+              <a:rPr lang="en-CA" dirty="0"/>
+              <a:t>Series: Parallel of resistors</a:t>
+            </a:r>
+          </a:p>
+          <a:p>
+            <a:pPr lvl="1"/>
+            <a:r>
+              <a:rPr lang="en-CA" dirty="0"/>
+              <a:t>Parallel: Series of resistors</a:t>
+            </a:r>
+          </a:p>
+          <a:p>
+            <a:r>
+              <a:rPr lang="en-CA" dirty="0"/>
+              <a:t>Inductors:</a:t>
+            </a:r>
+          </a:p>
+          <a:p>
+            <a:pPr lvl="1"/>
+            <a:r>
+              <a:rPr lang="en-CA" dirty="0"/>
+              <a:t>Same as resistors</a:t>
+            </a:r>
+          </a:p>
+        </p:txBody>
+      </p:sp>
+    </p:spTree>
+    <p:extLst>
+      <p:ext uri="{BB962C8B-B14F-4D97-AF65-F5344CB8AC3E}">
+        <p14:creationId xmlns:p14="http://schemas.microsoft.com/office/powerpoint/2010/main" val="2135196795"/>
+      </p:ext>
+    </p:extLst>
+  </p:cSld>
+  <p:clrMapOvr>
+    <a:masterClrMapping/>
+  </p:clrMapOvr>
+</p:sld>
+</file>
+
+<file path=ppt/slides/slide4.xml><?xml version="1.0" encoding="utf-8"?>
+<p:sld xmlns:a="http://schemas.openxmlformats.org/drawingml/2006/main" xmlns:r="http://schemas.openxmlformats.org/officeDocument/2006/relationships" xmlns:p="http://schemas.openxmlformats.org/presentationml/2006/main">
+  <p:cSld>
+    <p:spTree>
+      <p:nvGrpSpPr>
+        <p:cNvPr id="1" name=""/>
+        <p:cNvGrpSpPr/>
+        <p:nvPr/>
+      </p:nvGrpSpPr>
+      <p:grpSpPr>
+        <a:xfrm>
+          <a:off x="0" y="0"/>
+          <a:ext cx="0" cy="0"/>
+          <a:chOff x="0" y="0"/>
+          <a:chExt cx="0" cy="0"/>
+        </a:xfrm>
+      </p:grpSpPr>
+      <p:sp>
+        <p:nvSpPr>
+          <p:cNvPr id="2" name="Title 1">
+            <a:extLst>
+              <a:ext uri="{FF2B5EF4-FFF2-40B4-BE49-F238E27FC236}">
+                <a16:creationId xmlns:a16="http://schemas.microsoft.com/office/drawing/2014/main" id="{D70CD3CE-48C9-4216-AE27-38E4C35EBAAB}"/>
+              </a:ext>
+            </a:extLst>
+          </p:cNvPr>
+          <p:cNvSpPr>
+            <a:spLocks noGrp="1"/>
+          </p:cNvSpPr>
+          <p:nvPr>
+            <p:ph type="title"/>
+          </p:nvPr>
+        </p:nvSpPr>
+        <p:spPr/>
+        <p:txBody>
+          <a:bodyPr/>
+          <a:lstStyle/>
+          <a:p>
+            <a:r>
+              <a:rPr lang="en-CA" dirty="0"/>
+              <a:t>Project: </a:t>
+            </a:r>
+            <a:r>
+              <a:rPr lang="en-US" dirty="0"/>
+              <a:t>Timer circuit using capacitors and transistors</a:t>
+            </a:r>
+            <a:endParaRPr lang="en-CA" dirty="0"/>
+          </a:p>
+        </p:txBody>
+      </p:sp>
+      <p:sp>
+        <p:nvSpPr>
+          <p:cNvPr id="3" name="Content Placeholder 2">
+            <a:extLst>
+              <a:ext uri="{FF2B5EF4-FFF2-40B4-BE49-F238E27FC236}">
+                <a16:creationId xmlns:a16="http://schemas.microsoft.com/office/drawing/2014/main" id="{9C08E80B-6B85-42C7-8139-2C6728C2D7CD}"/>
+              </a:ext>
+            </a:extLst>
+          </p:cNvPr>
+          <p:cNvSpPr>
+            <a:spLocks noGrp="1"/>
+          </p:cNvSpPr>
+          <p:nvPr>
+            <p:ph idx="1"/>
+          </p:nvPr>
+        </p:nvSpPr>
+        <p:spPr/>
+        <p:txBody>
+          <a:bodyPr/>
+          <a:lstStyle/>
+          <a:p>
+            <a:r>
+              <a:rPr lang="en-CA" dirty="0"/>
+              <a:t>Prepare a worksheet to printout and give to students</a:t>
+            </a:r>
+          </a:p>
+          <a:p>
+            <a:pPr lvl="1"/>
+            <a:r>
+              <a:rPr lang="en-CA" dirty="0"/>
+              <a:t>Give them the formulas for calculating the resonance of a RLC circuit</a:t>
+            </a:r>
+          </a:p>
+          <a:p>
+            <a:pPr lvl="2"/>
+            <a:r>
+              <a:rPr lang="en-CA" dirty="0"/>
+              <a:t>Use that the tune an RLC circuit to turn on an LED at </a:t>
+            </a:r>
+            <a:r>
+              <a:rPr lang="en-CA"/>
+              <a:t>1Hz frequency</a:t>
+            </a:r>
+          </a:p>
+          <a:p>
+            <a:pPr marL="0" indent="0">
+              <a:buNone/>
+            </a:pPr>
+            <a:r>
+              <a:rPr lang="en-CA"/>
+              <a:t> </a:t>
+            </a:r>
+            <a:endParaRPr lang="en-CA" dirty="0"/>
+          </a:p>
+        </p:txBody>
+      </p:sp>
+    </p:spTree>
+    <p:extLst>
+      <p:ext uri="{BB962C8B-B14F-4D97-AF65-F5344CB8AC3E}">
+        <p14:creationId xmlns:p14="http://schemas.microsoft.com/office/powerpoint/2010/main" val="632011772"/>
       </p:ext>
     </p:extLst>
   </p:cSld>

</xml_diff>

<commit_message>
Create all the other workshops
</commit_message>
<xml_diff>
--- a/ECSE/Workshop-1/workshop1.pptx
+++ b/ECSE/Workshop-1/workshop1.pptx
@@ -7,8 +7,9 @@
   <p:sldIdLst>
     <p:sldId id="256" r:id="rId2"/>
     <p:sldId id="257" r:id="rId3"/>
-    <p:sldId id="258" r:id="rId4"/>
-    <p:sldId id="259" r:id="rId5"/>
+    <p:sldId id="260" r:id="rId4"/>
+    <p:sldId id="258" r:id="rId5"/>
+    <p:sldId id="259" r:id="rId6"/>
   </p:sldIdLst>
   <p:sldSz cx="12192000" cy="6858000"/>
   <p:notesSz cx="6858000" cy="9144000"/>
@@ -264,7 +265,7 @@
           <a:p>
             <a:fld id="{CB4ED598-43EB-408A-9236-B45AB4DAC6D0}" type="datetimeFigureOut">
               <a:rPr lang="en-CA" smtClean="0"/>
-              <a:t>2019-12-28</a:t>
+              <a:t>2019-12-29</a:t>
             </a:fld>
             <a:endParaRPr lang="en-CA"/>
           </a:p>
@@ -464,7 +465,7 @@
           <a:p>
             <a:fld id="{CB4ED598-43EB-408A-9236-B45AB4DAC6D0}" type="datetimeFigureOut">
               <a:rPr lang="en-CA" smtClean="0"/>
-              <a:t>2019-12-28</a:t>
+              <a:t>2019-12-29</a:t>
             </a:fld>
             <a:endParaRPr lang="en-CA"/>
           </a:p>
@@ -674,7 +675,7 @@
           <a:p>
             <a:fld id="{CB4ED598-43EB-408A-9236-B45AB4DAC6D0}" type="datetimeFigureOut">
               <a:rPr lang="en-CA" smtClean="0"/>
-              <a:t>2019-12-28</a:t>
+              <a:t>2019-12-29</a:t>
             </a:fld>
             <a:endParaRPr lang="en-CA"/>
           </a:p>
@@ -874,7 +875,7 @@
           <a:p>
             <a:fld id="{CB4ED598-43EB-408A-9236-B45AB4DAC6D0}" type="datetimeFigureOut">
               <a:rPr lang="en-CA" smtClean="0"/>
-              <a:t>2019-12-28</a:t>
+              <a:t>2019-12-29</a:t>
             </a:fld>
             <a:endParaRPr lang="en-CA"/>
           </a:p>
@@ -1150,7 +1151,7 @@
           <a:p>
             <a:fld id="{CB4ED598-43EB-408A-9236-B45AB4DAC6D0}" type="datetimeFigureOut">
               <a:rPr lang="en-CA" smtClean="0"/>
-              <a:t>2019-12-28</a:t>
+              <a:t>2019-12-29</a:t>
             </a:fld>
             <a:endParaRPr lang="en-CA"/>
           </a:p>
@@ -1418,7 +1419,7 @@
           <a:p>
             <a:fld id="{CB4ED598-43EB-408A-9236-B45AB4DAC6D0}" type="datetimeFigureOut">
               <a:rPr lang="en-CA" smtClean="0"/>
-              <a:t>2019-12-28</a:t>
+              <a:t>2019-12-29</a:t>
             </a:fld>
             <a:endParaRPr lang="en-CA"/>
           </a:p>
@@ -1833,7 +1834,7 @@
           <a:p>
             <a:fld id="{CB4ED598-43EB-408A-9236-B45AB4DAC6D0}" type="datetimeFigureOut">
               <a:rPr lang="en-CA" smtClean="0"/>
-              <a:t>2019-12-28</a:t>
+              <a:t>2019-12-29</a:t>
             </a:fld>
             <a:endParaRPr lang="en-CA"/>
           </a:p>
@@ -1975,7 +1976,7 @@
           <a:p>
             <a:fld id="{CB4ED598-43EB-408A-9236-B45AB4DAC6D0}" type="datetimeFigureOut">
               <a:rPr lang="en-CA" smtClean="0"/>
-              <a:t>2019-12-28</a:t>
+              <a:t>2019-12-29</a:t>
             </a:fld>
             <a:endParaRPr lang="en-CA"/>
           </a:p>
@@ -2088,7 +2089,7 @@
           <a:p>
             <a:fld id="{CB4ED598-43EB-408A-9236-B45AB4DAC6D0}" type="datetimeFigureOut">
               <a:rPr lang="en-CA" smtClean="0"/>
-              <a:t>2019-12-28</a:t>
+              <a:t>2019-12-29</a:t>
             </a:fld>
             <a:endParaRPr lang="en-CA"/>
           </a:p>
@@ -2401,7 +2402,7 @@
           <a:p>
             <a:fld id="{CB4ED598-43EB-408A-9236-B45AB4DAC6D0}" type="datetimeFigureOut">
               <a:rPr lang="en-CA" smtClean="0"/>
-              <a:t>2019-12-28</a:t>
+              <a:t>2019-12-29</a:t>
             </a:fld>
             <a:endParaRPr lang="en-CA"/>
           </a:p>
@@ -2690,7 +2691,7 @@
           <a:p>
             <a:fld id="{CB4ED598-43EB-408A-9236-B45AB4DAC6D0}" type="datetimeFigureOut">
               <a:rPr lang="en-CA" smtClean="0"/>
-              <a:t>2019-12-28</a:t>
+              <a:t>2019-12-29</a:t>
             </a:fld>
             <a:endParaRPr lang="en-CA"/>
           </a:p>
@@ -2933,7 +2934,7 @@
           <a:p>
             <a:fld id="{CB4ED598-43EB-408A-9236-B45AB4DAC6D0}" type="datetimeFigureOut">
               <a:rPr lang="en-CA" smtClean="0"/>
-              <a:t>2019-12-28</a:t>
+              <a:t>2019-12-29</a:t>
             </a:fld>
             <a:endParaRPr lang="en-CA"/>
           </a:p>
@@ -3501,7 +3502,7 @@
           <a:p>
             <a:r>
               <a:rPr lang="en-US" dirty="0"/>
-              <a:t>- Learning outcome: Basics of circuit analysis. Basic Safety when working with electronics.</a:t>
+              <a:t>- Learning outcome: Basics of circuit analysis. Safety when working with electronics.</a:t>
             </a:r>
           </a:p>
           <a:p>
@@ -3556,7 +3557,7 @@
           <p:cNvPr id="2" name="Title 1">
             <a:extLst>
               <a:ext uri="{FF2B5EF4-FFF2-40B4-BE49-F238E27FC236}">
-                <a16:creationId xmlns:a16="http://schemas.microsoft.com/office/drawing/2014/main" id="{F20C2503-84A2-4F21-9DB3-15889019898E}"/>
+                <a16:creationId xmlns:a16="http://schemas.microsoft.com/office/drawing/2014/main" id="{4118206E-CD5B-43EE-A58E-6DB210FE665F}"/>
               </a:ext>
             </a:extLst>
           </p:cNvPr>
@@ -3573,92 +3574,53 @@
           <a:lstStyle/>
           <a:p>
             <a:r>
-              <a:rPr lang="en-US" dirty="0"/>
-              <a:t>Basics of circuit analysis</a:t>
-            </a:r>
+              <a:rPr lang="en-CA" dirty="0"/>
+              <a:t>Voltage and Current</a:t>
+            </a:r>
+          </a:p>
+        </p:txBody>
+      </p:sp>
+      <p:sp>
+        <p:nvSpPr>
+          <p:cNvPr id="3" name="Content Placeholder 2">
+            <a:extLst>
+              <a:ext uri="{FF2B5EF4-FFF2-40B4-BE49-F238E27FC236}">
+                <a16:creationId xmlns:a16="http://schemas.microsoft.com/office/drawing/2014/main" id="{9C3CA6F1-0027-4746-BCC3-7C027611DB1C}"/>
+              </a:ext>
+            </a:extLst>
+          </p:cNvPr>
+          <p:cNvSpPr>
+            <a:spLocks noGrp="1"/>
+          </p:cNvSpPr>
+          <p:nvPr>
+            <p:ph idx="1"/>
+          </p:nvPr>
+        </p:nvSpPr>
+        <p:spPr/>
+        <p:txBody>
+          <a:bodyPr/>
+          <a:lstStyle/>
+          <a:p>
+            <a:r>
+              <a:rPr lang="en-CA" dirty="0"/>
+              <a:t>OHM’s LAW: V = IR</a:t>
+            </a:r>
+          </a:p>
+          <a:p>
+            <a:r>
+              <a:rPr lang="en-CA" dirty="0"/>
+              <a:t>P = POWER = VI = I^2/R = V^2*R</a:t>
+            </a:r>
+          </a:p>
+          <a:p>
             <a:endParaRPr lang="en-CA" dirty="0"/>
-          </a:p>
-        </p:txBody>
-      </p:sp>
-      <p:sp>
-        <p:nvSpPr>
-          <p:cNvPr id="3" name="Content Placeholder 2">
-            <a:extLst>
-              <a:ext uri="{FF2B5EF4-FFF2-40B4-BE49-F238E27FC236}">
-                <a16:creationId xmlns:a16="http://schemas.microsoft.com/office/drawing/2014/main" id="{DC76183D-B9E8-47AD-9873-66F08644F81E}"/>
-              </a:ext>
-            </a:extLst>
-          </p:cNvPr>
-          <p:cNvSpPr>
-            <a:spLocks noGrp="1"/>
-          </p:cNvSpPr>
-          <p:nvPr>
-            <p:ph idx="1"/>
-          </p:nvPr>
-        </p:nvSpPr>
-        <p:spPr/>
-        <p:txBody>
-          <a:bodyPr/>
-          <a:lstStyle/>
-          <a:p>
-            <a:r>
-              <a:rPr lang="en-CA" dirty="0"/>
-              <a:t>Resistors:</a:t>
-            </a:r>
-          </a:p>
-          <a:p>
-            <a:pPr lvl="1"/>
-            <a:r>
-              <a:rPr lang="en-CA" dirty="0"/>
-              <a:t>Series: Req = R1+R2</a:t>
-            </a:r>
-          </a:p>
-          <a:p>
-            <a:pPr lvl="1"/>
-            <a:r>
-              <a:rPr lang="en-CA" dirty="0"/>
-              <a:t>Parallel: Req = 1/(1/R1 + 1/R2)</a:t>
-            </a:r>
-          </a:p>
-          <a:p>
-            <a:r>
-              <a:rPr lang="en-CA" dirty="0"/>
-              <a:t>Capacitors:</a:t>
-            </a:r>
-          </a:p>
-          <a:p>
-            <a:pPr lvl="1"/>
-            <a:r>
-              <a:rPr lang="en-CA" dirty="0"/>
-              <a:t>Series: Parallel of resistors</a:t>
-            </a:r>
-          </a:p>
-          <a:p>
-            <a:pPr lvl="1"/>
-            <a:r>
-              <a:rPr lang="en-CA" dirty="0"/>
-              <a:t>Parallel: Series of resistors</a:t>
-            </a:r>
-          </a:p>
-          <a:p>
-            <a:r>
-              <a:rPr lang="en-CA" dirty="0"/>
-              <a:t>Inductors:</a:t>
-            </a:r>
-          </a:p>
-          <a:p>
-            <a:pPr lvl="1"/>
-            <a:r>
-              <a:rPr lang="en-CA" dirty="0"/>
-              <a:t>Same as resistors</a:t>
-            </a:r>
           </a:p>
         </p:txBody>
       </p:sp>
     </p:spTree>
     <p:extLst>
       <p:ext uri="{BB962C8B-B14F-4D97-AF65-F5344CB8AC3E}">
-        <p14:creationId xmlns:p14="http://schemas.microsoft.com/office/powerpoint/2010/main" val="2135196795"/>
+        <p14:creationId xmlns:p14="http://schemas.microsoft.com/office/powerpoint/2010/main" val="3427983131"/>
       </p:ext>
     </p:extLst>
   </p:cSld>
@@ -3690,6 +3652,179 @@
           <p:cNvPr id="2" name="Title 1">
             <a:extLst>
               <a:ext uri="{FF2B5EF4-FFF2-40B4-BE49-F238E27FC236}">
+                <a16:creationId xmlns:a16="http://schemas.microsoft.com/office/drawing/2014/main" id="{F20C2503-84A2-4F21-9DB3-15889019898E}"/>
+              </a:ext>
+            </a:extLst>
+          </p:cNvPr>
+          <p:cNvSpPr>
+            <a:spLocks noGrp="1"/>
+          </p:cNvSpPr>
+          <p:nvPr>
+            <p:ph type="title"/>
+          </p:nvPr>
+        </p:nvSpPr>
+        <p:spPr/>
+        <p:txBody>
+          <a:bodyPr/>
+          <a:lstStyle/>
+          <a:p>
+            <a:r>
+              <a:rPr lang="en-US" dirty="0"/>
+              <a:t>Basics of circuit analysis</a:t>
+            </a:r>
+            <a:endParaRPr lang="en-CA" dirty="0"/>
+          </a:p>
+        </p:txBody>
+      </p:sp>
+      <p:sp>
+        <p:nvSpPr>
+          <p:cNvPr id="3" name="Content Placeholder 2">
+            <a:extLst>
+              <a:ext uri="{FF2B5EF4-FFF2-40B4-BE49-F238E27FC236}">
+                <a16:creationId xmlns:a16="http://schemas.microsoft.com/office/drawing/2014/main" id="{DC76183D-B9E8-47AD-9873-66F08644F81E}"/>
+              </a:ext>
+            </a:extLst>
+          </p:cNvPr>
+          <p:cNvSpPr>
+            <a:spLocks noGrp="1"/>
+          </p:cNvSpPr>
+          <p:nvPr>
+            <p:ph idx="1"/>
+          </p:nvPr>
+        </p:nvSpPr>
+        <p:spPr/>
+        <p:txBody>
+          <a:bodyPr/>
+          <a:lstStyle/>
+          <a:p>
+            <a:r>
+              <a:rPr lang="en-CA" dirty="0"/>
+              <a:t>Resistors:</a:t>
+            </a:r>
+          </a:p>
+          <a:p>
+            <a:pPr lvl="1"/>
+            <a:r>
+              <a:rPr lang="en-CA" dirty="0"/>
+              <a:t>Series: Req = R1+R2</a:t>
+            </a:r>
+          </a:p>
+          <a:p>
+            <a:pPr lvl="1"/>
+            <a:r>
+              <a:rPr lang="en-CA" dirty="0"/>
+              <a:t>Parallel: Req = 1/(1/R1 + 1/R2)</a:t>
+            </a:r>
+          </a:p>
+          <a:p>
+            <a:r>
+              <a:rPr lang="en-CA" dirty="0"/>
+              <a:t>Capacitors:</a:t>
+            </a:r>
+          </a:p>
+          <a:p>
+            <a:pPr lvl="1"/>
+            <a:r>
+              <a:rPr lang="en-CA" dirty="0"/>
+              <a:t>Series: </a:t>
+            </a:r>
+            <a:r>
+              <a:rPr lang="en-CA" dirty="0" err="1"/>
+              <a:t>Ceq</a:t>
+            </a:r>
+            <a:r>
+              <a:rPr lang="en-CA" dirty="0"/>
+              <a:t> = 1/(1/C1 + 1/C2) </a:t>
+            </a:r>
+          </a:p>
+          <a:p>
+            <a:pPr lvl="1"/>
+            <a:r>
+              <a:rPr lang="en-CA" dirty="0"/>
+              <a:t>Parallel: </a:t>
+            </a:r>
+            <a:r>
+              <a:rPr lang="en-CA" dirty="0" err="1"/>
+              <a:t>Ceq</a:t>
+            </a:r>
+            <a:r>
+              <a:rPr lang="en-CA" dirty="0"/>
+              <a:t> = C1+C2</a:t>
+            </a:r>
+          </a:p>
+          <a:p>
+            <a:r>
+              <a:rPr lang="en-CA" dirty="0"/>
+              <a:t>Inductors:</a:t>
+            </a:r>
+          </a:p>
+          <a:p>
+            <a:pPr lvl="1"/>
+            <a:r>
+              <a:rPr lang="en-CA" dirty="0"/>
+              <a:t>Series: </a:t>
+            </a:r>
+            <a:r>
+              <a:rPr lang="en-CA" dirty="0" err="1"/>
+              <a:t>Ieq</a:t>
+            </a:r>
+            <a:r>
+              <a:rPr lang="en-CA" dirty="0"/>
+              <a:t> = I1+I2</a:t>
+            </a:r>
+          </a:p>
+          <a:p>
+            <a:pPr lvl="1"/>
+            <a:r>
+              <a:rPr lang="en-CA" dirty="0"/>
+              <a:t>Parallel: </a:t>
+            </a:r>
+            <a:r>
+              <a:rPr lang="en-CA" dirty="0" err="1"/>
+              <a:t>Ieq</a:t>
+            </a:r>
+            <a:r>
+              <a:rPr lang="en-CA" dirty="0"/>
+              <a:t> = 1/(1/I1 + 1/I2)</a:t>
+            </a:r>
+          </a:p>
+        </p:txBody>
+      </p:sp>
+    </p:spTree>
+    <p:extLst>
+      <p:ext uri="{BB962C8B-B14F-4D97-AF65-F5344CB8AC3E}">
+        <p14:creationId xmlns:p14="http://schemas.microsoft.com/office/powerpoint/2010/main" val="2135196795"/>
+      </p:ext>
+    </p:extLst>
+  </p:cSld>
+  <p:clrMapOvr>
+    <a:masterClrMapping/>
+  </p:clrMapOvr>
+</p:sld>
+</file>
+
+<file path=ppt/slides/slide5.xml><?xml version="1.0" encoding="utf-8"?>
+<p:sld xmlns:a="http://schemas.openxmlformats.org/drawingml/2006/main" xmlns:r="http://schemas.openxmlformats.org/officeDocument/2006/relationships" xmlns:p="http://schemas.openxmlformats.org/presentationml/2006/main">
+  <p:cSld>
+    <p:spTree>
+      <p:nvGrpSpPr>
+        <p:cNvPr id="1" name=""/>
+        <p:cNvGrpSpPr/>
+        <p:nvPr/>
+      </p:nvGrpSpPr>
+      <p:grpSpPr>
+        <a:xfrm>
+          <a:off x="0" y="0"/>
+          <a:ext cx="0" cy="0"/>
+          <a:chOff x="0" y="0"/>
+          <a:chExt cx="0" cy="0"/>
+        </a:xfrm>
+      </p:grpSpPr>
+      <p:sp>
+        <p:nvSpPr>
+          <p:cNvPr id="2" name="Title 1">
+            <a:extLst>
+              <a:ext uri="{FF2B5EF4-FFF2-40B4-BE49-F238E27FC236}">
                 <a16:creationId xmlns:a16="http://schemas.microsoft.com/office/drawing/2014/main" id="{D70CD3CE-48C9-4216-AE27-38E4C35EBAAB}"/>
               </a:ext>
             </a:extLst>
@@ -3755,11 +3890,7 @@
             <a:pPr lvl="2"/>
             <a:r>
               <a:rPr lang="en-CA" dirty="0"/>
-              <a:t>Use that the tune an RLC circuit to turn on an LED at </a:t>
-            </a:r>
-            <a:r>
-              <a:rPr lang="en-CA"/>
-              <a:t>1Hz frequency</a:t>
+              <a:t>Use that the tune an RLC circuit to turn on an LED at 1Hz frequency</a:t>
             </a:r>
           </a:p>
           <a:p>
@@ -3767,10 +3898,9 @@
               <a:buNone/>
             </a:pPr>
             <a:r>
-              <a:rPr lang="en-CA"/>
+              <a:rPr lang="en-CA" dirty="0"/>
               <a:t> </a:t>
             </a:r>
-            <a:endParaRPr lang="en-CA" dirty="0"/>
           </a:p>
         </p:txBody>
       </p:sp>

</xml_diff>

<commit_message>
filling Workshops. Cleaning up code
</commit_message>
<xml_diff>
--- a/ECSE/Workshop-1/workshop1.pptx
+++ b/ECSE/Workshop-1/workshop1.pptx
@@ -14,7 +14,6 @@
     <p:sldId id="264" r:id="rId8"/>
     <p:sldId id="262" r:id="rId9"/>
     <p:sldId id="265" r:id="rId10"/>
-    <p:sldId id="259" r:id="rId11"/>
   </p:sldIdLst>
   <p:sldSz cx="12192000" cy="6858000"/>
   <p:notesSz cx="6858000" cy="9144000"/>
@@ -270,7 +269,7 @@
           <a:p>
             <a:fld id="{CB4ED598-43EB-408A-9236-B45AB4DAC6D0}" type="datetimeFigureOut">
               <a:rPr lang="en-CA" smtClean="0"/>
-              <a:t>2020-01-04</a:t>
+              <a:t>2020-01-19</a:t>
             </a:fld>
             <a:endParaRPr lang="en-CA"/>
           </a:p>
@@ -470,7 +469,7 @@
           <a:p>
             <a:fld id="{CB4ED598-43EB-408A-9236-B45AB4DAC6D0}" type="datetimeFigureOut">
               <a:rPr lang="en-CA" smtClean="0"/>
-              <a:t>2020-01-04</a:t>
+              <a:t>2020-01-19</a:t>
             </a:fld>
             <a:endParaRPr lang="en-CA"/>
           </a:p>
@@ -680,7 +679,7 @@
           <a:p>
             <a:fld id="{CB4ED598-43EB-408A-9236-B45AB4DAC6D0}" type="datetimeFigureOut">
               <a:rPr lang="en-CA" smtClean="0"/>
-              <a:t>2020-01-04</a:t>
+              <a:t>2020-01-19</a:t>
             </a:fld>
             <a:endParaRPr lang="en-CA"/>
           </a:p>
@@ -880,7 +879,7 @@
           <a:p>
             <a:fld id="{CB4ED598-43EB-408A-9236-B45AB4DAC6D0}" type="datetimeFigureOut">
               <a:rPr lang="en-CA" smtClean="0"/>
-              <a:t>2020-01-04</a:t>
+              <a:t>2020-01-19</a:t>
             </a:fld>
             <a:endParaRPr lang="en-CA"/>
           </a:p>
@@ -1156,7 +1155,7 @@
           <a:p>
             <a:fld id="{CB4ED598-43EB-408A-9236-B45AB4DAC6D0}" type="datetimeFigureOut">
               <a:rPr lang="en-CA" smtClean="0"/>
-              <a:t>2020-01-04</a:t>
+              <a:t>2020-01-19</a:t>
             </a:fld>
             <a:endParaRPr lang="en-CA"/>
           </a:p>
@@ -1424,7 +1423,7 @@
           <a:p>
             <a:fld id="{CB4ED598-43EB-408A-9236-B45AB4DAC6D0}" type="datetimeFigureOut">
               <a:rPr lang="en-CA" smtClean="0"/>
-              <a:t>2020-01-04</a:t>
+              <a:t>2020-01-19</a:t>
             </a:fld>
             <a:endParaRPr lang="en-CA"/>
           </a:p>
@@ -1839,7 +1838,7 @@
           <a:p>
             <a:fld id="{CB4ED598-43EB-408A-9236-B45AB4DAC6D0}" type="datetimeFigureOut">
               <a:rPr lang="en-CA" smtClean="0"/>
-              <a:t>2020-01-04</a:t>
+              <a:t>2020-01-19</a:t>
             </a:fld>
             <a:endParaRPr lang="en-CA"/>
           </a:p>
@@ -1981,7 +1980,7 @@
           <a:p>
             <a:fld id="{CB4ED598-43EB-408A-9236-B45AB4DAC6D0}" type="datetimeFigureOut">
               <a:rPr lang="en-CA" smtClean="0"/>
-              <a:t>2020-01-04</a:t>
+              <a:t>2020-01-19</a:t>
             </a:fld>
             <a:endParaRPr lang="en-CA"/>
           </a:p>
@@ -2094,7 +2093,7 @@
           <a:p>
             <a:fld id="{CB4ED598-43EB-408A-9236-B45AB4DAC6D0}" type="datetimeFigureOut">
               <a:rPr lang="en-CA" smtClean="0"/>
-              <a:t>2020-01-04</a:t>
+              <a:t>2020-01-19</a:t>
             </a:fld>
             <a:endParaRPr lang="en-CA"/>
           </a:p>
@@ -2407,7 +2406,7 @@
           <a:p>
             <a:fld id="{CB4ED598-43EB-408A-9236-B45AB4DAC6D0}" type="datetimeFigureOut">
               <a:rPr lang="en-CA" smtClean="0"/>
-              <a:t>2020-01-04</a:t>
+              <a:t>2020-01-19</a:t>
             </a:fld>
             <a:endParaRPr lang="en-CA"/>
           </a:p>
@@ -2696,7 +2695,7 @@
           <a:p>
             <a:fld id="{CB4ED598-43EB-408A-9236-B45AB4DAC6D0}" type="datetimeFigureOut">
               <a:rPr lang="en-CA" smtClean="0"/>
-              <a:t>2020-01-04</a:t>
+              <a:t>2020-01-19</a:t>
             </a:fld>
             <a:endParaRPr lang="en-CA"/>
           </a:p>
@@ -2939,7 +2938,7 @@
           <a:p>
             <a:fld id="{CB4ED598-43EB-408A-9236-B45AB4DAC6D0}" type="datetimeFigureOut">
               <a:rPr lang="en-CA" smtClean="0"/>
-              <a:t>2020-01-04</a:t>
+              <a:t>2020-01-19</a:t>
             </a:fld>
             <a:endParaRPr lang="en-CA"/>
           </a:p>
@@ -3439,138 +3438,6 @@
 </p:sld>
 </file>
 
-<file path=ppt/slides/slide10.xml><?xml version="1.0" encoding="utf-8"?>
-<p:sld xmlns:a="http://schemas.openxmlformats.org/drawingml/2006/main" xmlns:r="http://schemas.openxmlformats.org/officeDocument/2006/relationships" xmlns:p="http://schemas.openxmlformats.org/presentationml/2006/main">
-  <p:cSld>
-    <p:spTree>
-      <p:nvGrpSpPr>
-        <p:cNvPr id="1" name=""/>
-        <p:cNvGrpSpPr/>
-        <p:nvPr/>
-      </p:nvGrpSpPr>
-      <p:grpSpPr>
-        <a:xfrm>
-          <a:off x="0" y="0"/>
-          <a:ext cx="0" cy="0"/>
-          <a:chOff x="0" y="0"/>
-          <a:chExt cx="0" cy="0"/>
-        </a:xfrm>
-      </p:grpSpPr>
-      <p:sp>
-        <p:nvSpPr>
-          <p:cNvPr id="2" name="Title 1">
-            <a:extLst>
-              <a:ext uri="{FF2B5EF4-FFF2-40B4-BE49-F238E27FC236}">
-                <a16:creationId xmlns:a16="http://schemas.microsoft.com/office/drawing/2014/main" id="{D70CD3CE-48C9-4216-AE27-38E4C35EBAAB}"/>
-              </a:ext>
-            </a:extLst>
-          </p:cNvPr>
-          <p:cNvSpPr>
-            <a:spLocks noGrp="1"/>
-          </p:cNvSpPr>
-          <p:nvPr>
-            <p:ph type="title"/>
-          </p:nvPr>
-        </p:nvSpPr>
-        <p:spPr/>
-        <p:txBody>
-          <a:bodyPr/>
-          <a:lstStyle/>
-          <a:p>
-            <a:r>
-              <a:rPr lang="en-CA" dirty="0"/>
-              <a:t>Project: </a:t>
-            </a:r>
-            <a:r>
-              <a:rPr lang="en-US" dirty="0"/>
-              <a:t>Timer circuit using capacitors and transistors</a:t>
-            </a:r>
-            <a:endParaRPr lang="en-CA" dirty="0"/>
-          </a:p>
-        </p:txBody>
-      </p:sp>
-      <p:sp>
-        <p:nvSpPr>
-          <p:cNvPr id="3" name="Content Placeholder 2">
-            <a:extLst>
-              <a:ext uri="{FF2B5EF4-FFF2-40B4-BE49-F238E27FC236}">
-                <a16:creationId xmlns:a16="http://schemas.microsoft.com/office/drawing/2014/main" id="{9C08E80B-6B85-42C7-8139-2C6728C2D7CD}"/>
-              </a:ext>
-            </a:extLst>
-          </p:cNvPr>
-          <p:cNvSpPr>
-            <a:spLocks noGrp="1"/>
-          </p:cNvSpPr>
-          <p:nvPr>
-            <p:ph idx="1"/>
-          </p:nvPr>
-        </p:nvSpPr>
-        <p:spPr/>
-        <p:txBody>
-          <a:bodyPr/>
-          <a:lstStyle/>
-          <a:p>
-            <a:r>
-              <a:rPr lang="en-CA" dirty="0"/>
-              <a:t>Prepare a worksheet to printout and give to students</a:t>
-            </a:r>
-          </a:p>
-          <a:p>
-            <a:pPr lvl="1"/>
-            <a:r>
-              <a:rPr lang="en-CA" dirty="0"/>
-              <a:t>Give them the formulas for calculating the resonance of a RLC circuit</a:t>
-            </a:r>
-          </a:p>
-          <a:p>
-            <a:pPr lvl="2"/>
-            <a:r>
-              <a:rPr lang="en-CA" dirty="0"/>
-              <a:t>Use that the tune an RLC circuit to turn on an LED at 1Hz frequency</a:t>
-            </a:r>
-          </a:p>
-          <a:p>
-            <a:pPr lvl="2"/>
-            <a:endParaRPr lang="en-CA" dirty="0"/>
-          </a:p>
-          <a:p>
-            <a:pPr lvl="2"/>
-            <a:endParaRPr lang="en-CA" dirty="0"/>
-          </a:p>
-          <a:p>
-            <a:pPr lvl="2"/>
-            <a:endParaRPr lang="en-CA" dirty="0"/>
-          </a:p>
-          <a:p>
-            <a:r>
-              <a:rPr lang="en-CA" dirty="0"/>
-              <a:t>[SCRAP PROJECT, USELESS AND WILL NOT TEACH THEM ANYTHING]</a:t>
-            </a:r>
-          </a:p>
-          <a:p>
-            <a:pPr marL="0" indent="0">
-              <a:buNone/>
-            </a:pPr>
-            <a:r>
-              <a:rPr lang="en-CA" dirty="0"/>
-              <a:t> </a:t>
-            </a:r>
-          </a:p>
-        </p:txBody>
-      </p:sp>
-    </p:spTree>
-    <p:extLst>
-      <p:ext uri="{BB962C8B-B14F-4D97-AF65-F5344CB8AC3E}">
-        <p14:creationId xmlns:p14="http://schemas.microsoft.com/office/powerpoint/2010/main" val="632011772"/>
-      </p:ext>
-    </p:extLst>
-  </p:cSld>
-  <p:clrMapOvr>
-    <a:masterClrMapping/>
-  </p:clrMapOvr>
-</p:sld>
-</file>
-
 <file path=ppt/slides/slide2.xml><?xml version="1.0" encoding="utf-8"?>
 <p:sld xmlns:a="http://schemas.openxmlformats.org/drawingml/2006/main" xmlns:r="http://schemas.openxmlformats.org/officeDocument/2006/relationships" xmlns:p="http://schemas.openxmlformats.org/presentationml/2006/main">
   <p:cSld>

</xml_diff>

<commit_message>
Adding images to Workshop 1. Deleting extra files.
</commit_message>
<xml_diff>
--- a/ECSE/Workshop-1/workshop1.pptx
+++ b/ECSE/Workshop-1/workshop1.pptx
@@ -9,11 +9,13 @@
     <p:sldId id="257" r:id="rId3"/>
     <p:sldId id="260" r:id="rId4"/>
     <p:sldId id="261" r:id="rId5"/>
-    <p:sldId id="258" r:id="rId6"/>
-    <p:sldId id="263" r:id="rId7"/>
-    <p:sldId id="264" r:id="rId8"/>
-    <p:sldId id="262" r:id="rId9"/>
-    <p:sldId id="265" r:id="rId10"/>
+    <p:sldId id="267" r:id="rId6"/>
+    <p:sldId id="266" r:id="rId7"/>
+    <p:sldId id="258" r:id="rId8"/>
+    <p:sldId id="263" r:id="rId9"/>
+    <p:sldId id="264" r:id="rId10"/>
+    <p:sldId id="262" r:id="rId11"/>
+    <p:sldId id="265" r:id="rId12"/>
   </p:sldIdLst>
   <p:sldSz cx="12192000" cy="6858000"/>
   <p:notesSz cx="6858000" cy="9144000"/>
@@ -120,6 +122,168 @@
 </p:presentation>
 </file>
 
+<file path=ppt/ink/ink1.xml><?xml version="1.0" encoding="utf-8"?>
+<inkml:ink xmlns:inkml="http://www.w3.org/2003/InkML">
+  <inkml:definitions>
+    <inkml:context xml:id="ctx0">
+      <inkml:inkSource xml:id="inkSrc0">
+        <inkml:traceFormat>
+          <inkml:channel name="X" type="integer" min="-2.14748E9" max="2.14748E9" units="cm"/>
+          <inkml:channel name="Y" type="integer" min="-2.14748E9" max="2.14748E9" units="cm"/>
+        </inkml:traceFormat>
+        <inkml:channelProperties>
+          <inkml:channelProperty channel="X" name="resolution" value="1000" units="1/cm"/>
+          <inkml:channelProperty channel="Y" name="resolution" value="1000" units="1/cm"/>
+        </inkml:channelProperties>
+      </inkml:inkSource>
+      <inkml:timestamp xml:id="ts0" timeString="2020-01-22T22:18:11.712"/>
+    </inkml:context>
+    <inkml:brush xml:id="br0">
+      <inkml:brushProperty name="width" value="0.1" units="cm"/>
+      <inkml:brushProperty name="height" value="0.1" units="cm"/>
+      <inkml:brushProperty name="color" value="#333333"/>
+      <inkml:brushProperty name="ignorePressure" value="1"/>
+    </inkml:brush>
+  </inkml:definitions>
+  <inkml:trace contextRef="#ctx0" brushRef="#br0">1 1114,'90'-14,"287"-26,-14 0,204 11,-565 29,1 0,0 0,0 0,0-1,0 1,0 0,0-1,-1 0,1 0,0 0,-1 0,1 0,0-1,-1 1,1-1,1-1,-1 0,-1-1,1 1,-1 0,0-1,0 0,-1 1,1-1,-1 0,1 0,-1 0,0 0,0-3,5-27,-2-1,-1 1,-2-1,-2-21,-17-138,9 120,3-1,3-46,3 121,1-1,-1 1,0 0,0-1,1 1,-1 0,0 0,0 0,1-1,-1 1,0 0,1 0,-1 0,0 0,1 0,-1-1,0 1,1 0,-1 0,0 0,1 0,-1 0,0 0,1 0,-1 0,0 0,1 0,-1 1,1-1,-1 0,0 0,0 0,1 0,-1 0,0 1,1-1,-1 0,0 0,0 0,1 1,-1-1,0 0,0 1,22 11,-18-10,98 61,-4 3,-2 5,7 13,-55-42,53 46,3-4,4-5,7-2,-114-76,25 14,-1-1,17 5,-36-16,0-1,0 1,0-1,0-1,0 1,0-1,0 0,0-1,0 0,1 0,-1 0,0 0,0-1,0 0,3-1,-5 0,0-1,0 1,0-1,0 0,0 0,-1-1,1 1,-1-1,0 1,0-1,-1 0,1 0,-1 0,0-1,0 1,0 0,1-5,4-13,-1 0,-1 0,0-4,-3 13,40-275,-20 120,9-7,-31 175,2-8,-1-1,1 1,1 0,-1 1,1-1,1 0,3-5,-6 12,0-1,1 1,-1-1,1 1,-1 0,1-1,0 1,-1 0,1 0,0 0,0 0,0 1,0-1,0 0,0 1,0 0,0-1,0 1,0 0,0 0,0 0,0 0,0 0,0 1,0-1,0 0,0 1,0 0,0-1,0 1,0 0,1 1,17 8,0 0,-1 1,-1 0,0 2,0 0,-2 1,1 1,3 6,34 38,29 43,-46-55,103 122,81 71,-148-168,4-4,2-3,3-3,30 13,-106-70,1-1,-1-1,1 1,0-1,0-1,0 1,3 0,-8-3,0 0,-1 0,1 0,0 0,0 0,0 0,-1 0,1-1,0 1,0-1,-1 1,1-1,0 0,-1 1,1-1,0 0,-1 0,1 0,-1-1,0 1,1 0,-1 0,0-1,0 1,0-1,0 1,0-1,0 1,0-1,0 0,-1 1,1-2,5-14,0 0,-1 0,-1 0,-1 0,-1-1,0 1,-1-10,-1-39,-4-24,2 49,-11-150,2 72,6-1,5 0,12-90,-12 206,1-4,0 1,0-1,1 1,0 0,0 0,1-1,0 1,-2 6,0 0,-1-1,1 1,0 0,0 0,0 0,0 0,0 0,0 0,0 0,1 1,-1-1,0 0,0 1,1-1,-1 0,0 1,1 0,-1-1,1 1,-1 0,0 0,1 0,-1 0,1 0,-1 0,0 0,1 0,-1 0,1 1,-1-1,0 1,1-1,-1 1,0-1,1 1,-1 0,1 0,21 12,0 1,-1 1,0 0,-1 2,-1 0,-1 2,0 0,10 15,27 38,40 69,-82-120,106 157,7-6,131 135,-245-294,68 69,-74-76,1 0,0 0,0-1,0 0,0 0,1-1,0 0,-1-1,2 1,4 0,-12-4,1 1,0-1,0 0,0 0,0 0,-1 0,1 0,0 0,0-1,0 0,-1 1,1-1,0 0,-1 0,1 0,-1-1,1 1,-1-1,1 1,-1-1,2-2,0 0,-1 0,0-1,1 1,-1-1,-1 0,1 0,-1 0,0 0,0 0,0-1,-1 0,3-11,-1-1,-1 1,-1 0,0-1,-1 0,-3-14,-3-17,-3 1,-2 0,-2 1,-17-41,19 68,1 0,10 20,0 0,-1 0,1 0,0-1,0 1,0 0,0 0,0 0,-1-1,1 1,0 0,0 0,0 0,0-1,0 1,0 0,0 0,0 0,0-1,0 1,0 0,0 0,0-1,0 1,0 0,0 0,0 0,0-1,0 1,0 0,0 0,0-1,1 1,-1 0,0 0,0 0,0 0,0-1,0 1,1 0,-1 0,0 0,0 0,0 0,0-1,1 1,-1 0,0 0,667-11,365 4,-688 26,-76-3,57-13,-325-3,-1 0</inkml:trace>
+</inkml:ink>
+</file>
+
+<file path=ppt/ink/ink2.xml><?xml version="1.0" encoding="utf-8"?>
+<inkml:ink xmlns:inkml="http://www.w3.org/2003/InkML">
+  <inkml:definitions>
+    <inkml:context xml:id="ctx0">
+      <inkml:inkSource xml:id="inkSrc0">
+        <inkml:traceFormat>
+          <inkml:channel name="X" type="integer" min="-2.14748E9" max="2.14748E9" units="cm"/>
+          <inkml:channel name="Y" type="integer" min="-2.14748E9" max="2.14748E9" units="cm"/>
+        </inkml:traceFormat>
+        <inkml:channelProperties>
+          <inkml:channelProperty channel="X" name="resolution" value="1000" units="1/cm"/>
+          <inkml:channelProperty channel="Y" name="resolution" value="1000" units="1/cm"/>
+        </inkml:channelProperties>
+      </inkml:inkSource>
+      <inkml:timestamp xml:id="ts0" timeString="2020-01-22T22:18:21.950"/>
+    </inkml:context>
+    <inkml:brush xml:id="br0">
+      <inkml:brushProperty name="width" value="0.1" units="cm"/>
+      <inkml:brushProperty name="height" value="0.1" units="cm"/>
+      <inkml:brushProperty name="color" value="#333333"/>
+      <inkml:brushProperty name="ignorePressure" value="1"/>
+    </inkml:brush>
+  </inkml:definitions>
+  <inkml:trace contextRef="#ctx0" brushRef="#br0">0 1,'18'1,"0"0,-1 2,17 4,36 6,168-3,132-15,-230 1,158-7,-62 0,0 10,9 12,-177-5,-66-6</inkml:trace>
+</inkml:ink>
+</file>
+
+<file path=ppt/ink/ink3.xml><?xml version="1.0" encoding="utf-8"?>
+<inkml:ink xmlns:inkml="http://www.w3.org/2003/InkML">
+  <inkml:definitions>
+    <inkml:context xml:id="ctx0">
+      <inkml:inkSource xml:id="inkSrc0">
+        <inkml:traceFormat>
+          <inkml:channel name="X" type="integer" min="-2.14748E9" max="2.14748E9" units="cm"/>
+          <inkml:channel name="Y" type="integer" min="-2.14748E9" max="2.14748E9" units="cm"/>
+        </inkml:traceFormat>
+        <inkml:channelProperties>
+          <inkml:channelProperty channel="X" name="resolution" value="1000" units="1/cm"/>
+          <inkml:channelProperty channel="Y" name="resolution" value="1000" units="1/cm"/>
+        </inkml:channelProperties>
+      </inkml:inkSource>
+      <inkml:timestamp xml:id="ts0" timeString="2020-01-22T22:18:22.481"/>
+    </inkml:context>
+    <inkml:brush xml:id="br0">
+      <inkml:brushProperty name="width" value="0.1" units="cm"/>
+      <inkml:brushProperty name="height" value="0.1" units="cm"/>
+      <inkml:brushProperty name="color" value="#333333"/>
+      <inkml:brushProperty name="ignorePressure" value="1"/>
+    </inkml:brush>
+  </inkml:definitions>
+  <inkml:trace contextRef="#ctx0" brushRef="#br0">8 0,'5'14,"-1"1,0 0,0 0,-2 0,0 0,0 0,-1 0,-2 6,3 16,7 262,-23 194,0-46,2-35,11-394</inkml:trace>
+</inkml:ink>
+</file>
+
+<file path=ppt/ink/ink4.xml><?xml version="1.0" encoding="utf-8"?>
+<inkml:ink xmlns:inkml="http://www.w3.org/2003/InkML">
+  <inkml:definitions>
+    <inkml:context xml:id="ctx0">
+      <inkml:inkSource xml:id="inkSrc0">
+        <inkml:traceFormat>
+          <inkml:channel name="X" type="integer" min="-2.14748E9" max="2.14748E9" units="cm"/>
+          <inkml:channel name="Y" type="integer" min="-2.14748E9" max="2.14748E9" units="cm"/>
+        </inkml:traceFormat>
+        <inkml:channelProperties>
+          <inkml:channelProperty channel="X" name="resolution" value="1000" units="1/cm"/>
+          <inkml:channelProperty channel="Y" name="resolution" value="1000" units="1/cm"/>
+        </inkml:channelProperties>
+      </inkml:inkSource>
+      <inkml:timestamp xml:id="ts0" timeString="2020-01-22T22:18:23.278"/>
+    </inkml:context>
+    <inkml:brush xml:id="br0">
+      <inkml:brushProperty name="width" value="0.1" units="cm"/>
+      <inkml:brushProperty name="height" value="0.1" units="cm"/>
+      <inkml:brushProperty name="color" value="#333333"/>
+      <inkml:brushProperty name="ignorePressure" value="1"/>
+    </inkml:brush>
+  </inkml:definitions>
+  <inkml:trace contextRef="#ctx0" brushRef="#br0">16 0,'8'32,"-2"1,-1-1,-1 1,-2 0,-1 15,0 3,11 456,-25 77,-9-318,3-47,18-203</inkml:trace>
+</inkml:ink>
+</file>
+
+<file path=ppt/ink/ink5.xml><?xml version="1.0" encoding="utf-8"?>
+<inkml:ink xmlns:inkml="http://www.w3.org/2003/InkML">
+  <inkml:definitions>
+    <inkml:context xml:id="ctx0">
+      <inkml:inkSource xml:id="inkSrc0">
+        <inkml:traceFormat>
+          <inkml:channel name="X" type="integer" min="-2.14748E9" max="2.14748E9" units="cm"/>
+          <inkml:channel name="Y" type="integer" min="-2.14748E9" max="2.14748E9" units="cm"/>
+        </inkml:traceFormat>
+        <inkml:channelProperties>
+          <inkml:channelProperty channel="X" name="resolution" value="1000" units="1/cm"/>
+          <inkml:channelProperty channel="Y" name="resolution" value="1000" units="1/cm"/>
+        </inkml:channelProperties>
+      </inkml:inkSource>
+      <inkml:timestamp xml:id="ts0" timeString="2020-01-22T22:18:23.950"/>
+    </inkml:context>
+    <inkml:brush xml:id="br0">
+      <inkml:brushProperty name="width" value="0.1" units="cm"/>
+      <inkml:brushProperty name="height" value="0.1" units="cm"/>
+      <inkml:brushProperty name="color" value="#333333"/>
+      <inkml:brushProperty name="ignorePressure" value="1"/>
+    </inkml:brush>
+  </inkml:definitions>
+  <inkml:trace contextRef="#ctx0" brushRef="#br0">0 195,'151'-15,"454"-1,233-15,-54-57,-513 54,-246 31,-10 0,0 1,0 0,0 2,0 0,0 0,12 3,-26-3</inkml:trace>
+</inkml:ink>
+</file>
+
+<file path=ppt/ink/ink6.xml><?xml version="1.0" encoding="utf-8"?>
+<inkml:ink xmlns:inkml="http://www.w3.org/2003/InkML">
+  <inkml:definitions>
+    <inkml:context xml:id="ctx0">
+      <inkml:inkSource xml:id="inkSrc0">
+        <inkml:traceFormat>
+          <inkml:channel name="X" type="integer" min="-2.14748E9" max="2.14748E9" units="cm"/>
+          <inkml:channel name="Y" type="integer" min="-2.14748E9" max="2.14748E9" units="cm"/>
+        </inkml:traceFormat>
+        <inkml:channelProperties>
+          <inkml:channelProperty channel="X" name="resolution" value="1000" units="1/cm"/>
+          <inkml:channelProperty channel="Y" name="resolution" value="1000" units="1/cm"/>
+        </inkml:channelProperties>
+      </inkml:inkSource>
+      <inkml:timestamp xml:id="ts0" timeString="2020-01-22T22:18:31.013"/>
+    </inkml:context>
+    <inkml:brush xml:id="br0">
+      <inkml:brushProperty name="width" value="0.1" units="cm"/>
+      <inkml:brushProperty name="height" value="0.1" units="cm"/>
+      <inkml:brushProperty name="color" value="#333333"/>
+      <inkml:brushProperty name="ignorePressure" value="1"/>
+    </inkml:brush>
+  </inkml:definitions>
+  <inkml:trace contextRef="#ctx0" brushRef="#br0">1 746,'1079'-34,"-1022"28,-31 2,1 1,-1 2,24 1,-51-42,1-12,2 0,2 0,4-8,-5 43,2 1,0-1,1 1,1 0,0 1,1-1,1 1,1 1,1 0,9-11,-2 6,1 1,1 1,1 0,0 2,1 1,1 0,1 2,0 1,0 0,2 2,-1 1,1 1,1 1,0 1,0 2,0 1,0 1,1 1,0 1,-1 2,1 0,-1 2,0 1,0 1,0 2,0 1,10 4,8 7,-1 2,-2 1,0 2,-1 2,-2 2,0 2,-2 1,29 32,-40-35,-1 1,-1 0,-2 2,-1 1,-1 1,-2 0,-2 2,-1 0,-1 0,-2 1,4 23,-11-32,-2-1,0 1,-2 0,-1 0,-1 1,-1-2,-2 1,-2 9,2-17,-1 0,0 0,-2-1,0 0,0 0,-2-1,0 0,-1-1,-1 0,-1 0,0-1,-1 0,10-12,1-1,0 1,-1-1,0 1,1-1,-1 0,0-1,0 1,0 0,0-1,0 1,-1-1,1 0,0 0,-1 0,1-1,0 1,-1-1,1 0,-2 0,2-1,0 0,0 0,0 0,0-1,0 1,0-1,1 0,-1 0,1 0,-1 0,1 0,0 0,-1-1,1 1,1-1,-1 0,0 1,1-1,-1 0,1 0,-1-3,-10-23,1-2,1 1,2-1,1 0,1-1,2 0,1 0,2 0,1 0,2 0,0 0,3 1,0-1,2 1,1 0,2 0,1 1,1 0,2 1,1 1,1 0,1 1,1 1,2 1,1 0,0 1,2 2,7-6,11-8,1 2,2 2,1 2,1 1,1 3,50-20,-76 37,1 2,0 0,0 2,0 0,1 1,0 1,-1 2,1 0,0 1,0 1,0 2,-1 0,1 1,-1 1,0 1,0 1,16 8,-4 2,-1 0,-1 3,0 0,-2 2,0 2,-2 0,0 2,-2 1,-1 1,13 20,-11-9,-1 1,-3 1,-1 1,-2 1,-2 1,-2 1,-2 0,1 11,0 6,5 64,-17-104,-2 0,0 1,-1-1,-2 1,0-1,-2 0,-2 10,5-29,-11 36,5-33,4-26,-2-73,5 0,4 0,7-33,-6 91,2 0,1 0,2 1,1 0,2 1,1 0,1 1,2 0,1 2,9-11,-2 8,2 1,1 1,1 1,1 2,2 1,1 1,1 2,1 1,34-16,-40 25,1 2,0 0,1 2,0 2,1 1,-1 1,1 1,1 2,-1 1,0 2,1 1,31 6,-20 1,-1 2,0 2,0 1,-2 3,1 1,-2 2,-1 2,0 2,-2 1,5 6,-14-9,-1 1,0 1,-2 2,-1 1,-1 0,-1 2,-1 1,-2 0,-1 1,-1 1,-2 1,-1 0,-1 3,-5-5,-1 1,-2 0,-1 0,-2 0,0 0,-3 1,0-1,-2 0,-1 0,-2 0,-1 0,-1-1,-2 0,-13 27,13-101,5-10,2 0,3 0,2 0,2 0,3 0,2 1,2 0,8-19,-12 51,1 1,1 0,1 1,0 0,1 0,1 1,1 1,1 0,11-11,-3 7,0 2,1 0,1 2,0 0,2 1,21-9,0 5,0 1,1 3,0 1,1 3,1 2,0 2,0 3,13 1,-5 2,1 3,-1 2,0 3,0 2,19 7,-41-6,-1 1,-1 2,0 1,0 2,-1 1,-1 2,-1 1,-1 2,3 3,-4 0,-1 1,-2 2,0 1,-2 1,3 6,11 21,-2 2,10 26,-44-80,0 0,0-1,0 1,1 0,-1-1,1 1,0-1,0 0,0 0,1 0,1 1,35-37,12 5,1 2,2 2,0 3,2 2,0 3,50-11,1 6,28 1,159-16,1 12,145 14,-352 21,-67-7,-1-1,1 0,15-2,-30-1,-7 0</inkml:trace>
+</inkml:ink>
+</file>
+
 <file path=ppt/slideLayouts/slideLayout1.xml><?xml version="1.0" encoding="utf-8"?>
 <p:sldLayout xmlns:a="http://schemas.openxmlformats.org/drawingml/2006/main" xmlns:r="http://schemas.openxmlformats.org/officeDocument/2006/relationships" xmlns:p="http://schemas.openxmlformats.org/presentationml/2006/main" type="title" preserve="1">
   <p:cSld name="Title Slide">
@@ -269,7 +433,7 @@
           <a:p>
             <a:fld id="{CB4ED598-43EB-408A-9236-B45AB4DAC6D0}" type="datetimeFigureOut">
               <a:rPr lang="en-CA" smtClean="0"/>
-              <a:t>2020-01-19</a:t>
+              <a:t>2020-01-22</a:t>
             </a:fld>
             <a:endParaRPr lang="en-CA"/>
           </a:p>
@@ -469,7 +633,7 @@
           <a:p>
             <a:fld id="{CB4ED598-43EB-408A-9236-B45AB4DAC6D0}" type="datetimeFigureOut">
               <a:rPr lang="en-CA" smtClean="0"/>
-              <a:t>2020-01-19</a:t>
+              <a:t>2020-01-22</a:t>
             </a:fld>
             <a:endParaRPr lang="en-CA"/>
           </a:p>
@@ -679,7 +843,7 @@
           <a:p>
             <a:fld id="{CB4ED598-43EB-408A-9236-B45AB4DAC6D0}" type="datetimeFigureOut">
               <a:rPr lang="en-CA" smtClean="0"/>
-              <a:t>2020-01-19</a:t>
+              <a:t>2020-01-22</a:t>
             </a:fld>
             <a:endParaRPr lang="en-CA"/>
           </a:p>
@@ -879,7 +1043,7 @@
           <a:p>
             <a:fld id="{CB4ED598-43EB-408A-9236-B45AB4DAC6D0}" type="datetimeFigureOut">
               <a:rPr lang="en-CA" smtClean="0"/>
-              <a:t>2020-01-19</a:t>
+              <a:t>2020-01-22</a:t>
             </a:fld>
             <a:endParaRPr lang="en-CA"/>
           </a:p>
@@ -1155,7 +1319,7 @@
           <a:p>
             <a:fld id="{CB4ED598-43EB-408A-9236-B45AB4DAC6D0}" type="datetimeFigureOut">
               <a:rPr lang="en-CA" smtClean="0"/>
-              <a:t>2020-01-19</a:t>
+              <a:t>2020-01-22</a:t>
             </a:fld>
             <a:endParaRPr lang="en-CA"/>
           </a:p>
@@ -1423,7 +1587,7 @@
           <a:p>
             <a:fld id="{CB4ED598-43EB-408A-9236-B45AB4DAC6D0}" type="datetimeFigureOut">
               <a:rPr lang="en-CA" smtClean="0"/>
-              <a:t>2020-01-19</a:t>
+              <a:t>2020-01-22</a:t>
             </a:fld>
             <a:endParaRPr lang="en-CA"/>
           </a:p>
@@ -1838,7 +2002,7 @@
           <a:p>
             <a:fld id="{CB4ED598-43EB-408A-9236-B45AB4DAC6D0}" type="datetimeFigureOut">
               <a:rPr lang="en-CA" smtClean="0"/>
-              <a:t>2020-01-19</a:t>
+              <a:t>2020-01-22</a:t>
             </a:fld>
             <a:endParaRPr lang="en-CA"/>
           </a:p>
@@ -1980,7 +2144,7 @@
           <a:p>
             <a:fld id="{CB4ED598-43EB-408A-9236-B45AB4DAC6D0}" type="datetimeFigureOut">
               <a:rPr lang="en-CA" smtClean="0"/>
-              <a:t>2020-01-19</a:t>
+              <a:t>2020-01-22</a:t>
             </a:fld>
             <a:endParaRPr lang="en-CA"/>
           </a:p>
@@ -2093,7 +2257,7 @@
           <a:p>
             <a:fld id="{CB4ED598-43EB-408A-9236-B45AB4DAC6D0}" type="datetimeFigureOut">
               <a:rPr lang="en-CA" smtClean="0"/>
-              <a:t>2020-01-19</a:t>
+              <a:t>2020-01-22</a:t>
             </a:fld>
             <a:endParaRPr lang="en-CA"/>
           </a:p>
@@ -2406,7 +2570,7 @@
           <a:p>
             <a:fld id="{CB4ED598-43EB-408A-9236-B45AB4DAC6D0}" type="datetimeFigureOut">
               <a:rPr lang="en-CA" smtClean="0"/>
-              <a:t>2020-01-19</a:t>
+              <a:t>2020-01-22</a:t>
             </a:fld>
             <a:endParaRPr lang="en-CA"/>
           </a:p>
@@ -2695,7 +2859,7 @@
           <a:p>
             <a:fld id="{CB4ED598-43EB-408A-9236-B45AB4DAC6D0}" type="datetimeFigureOut">
               <a:rPr lang="en-CA" smtClean="0"/>
-              <a:t>2020-01-19</a:t>
+              <a:t>2020-01-22</a:t>
             </a:fld>
             <a:endParaRPr lang="en-CA"/>
           </a:p>
@@ -2938,7 +3102,7 @@
           <a:p>
             <a:fld id="{CB4ED598-43EB-408A-9236-B45AB4DAC6D0}" type="datetimeFigureOut">
               <a:rPr lang="en-CA" smtClean="0"/>
-              <a:t>2020-01-19</a:t>
+              <a:t>2020-01-22</a:t>
             </a:fld>
             <a:endParaRPr lang="en-CA"/>
           </a:p>
@@ -3438,6 +3602,329 @@
 </p:sld>
 </file>
 
+<file path=ppt/slides/slide10.xml><?xml version="1.0" encoding="utf-8"?>
+<p:sld xmlns:a="http://schemas.openxmlformats.org/drawingml/2006/main" xmlns:r="http://schemas.openxmlformats.org/officeDocument/2006/relationships" xmlns:p="http://schemas.openxmlformats.org/presentationml/2006/main">
+  <p:cSld>
+    <p:spTree>
+      <p:nvGrpSpPr>
+        <p:cNvPr id="1" name=""/>
+        <p:cNvGrpSpPr/>
+        <p:nvPr/>
+      </p:nvGrpSpPr>
+      <p:grpSpPr>
+        <a:xfrm>
+          <a:off x="0" y="0"/>
+          <a:ext cx="0" cy="0"/>
+          <a:chOff x="0" y="0"/>
+          <a:chExt cx="0" cy="0"/>
+        </a:xfrm>
+      </p:grpSpPr>
+      <p:sp>
+        <p:nvSpPr>
+          <p:cNvPr id="2" name="Title 1">
+            <a:extLst>
+              <a:ext uri="{FF2B5EF4-FFF2-40B4-BE49-F238E27FC236}">
+                <a16:creationId xmlns:a16="http://schemas.microsoft.com/office/drawing/2014/main" id="{626B63E8-BC2B-417B-B484-FD03D55AC7A4}"/>
+              </a:ext>
+            </a:extLst>
+          </p:cNvPr>
+          <p:cNvSpPr>
+            <a:spLocks noGrp="1"/>
+          </p:cNvSpPr>
+          <p:nvPr>
+            <p:ph type="title"/>
+          </p:nvPr>
+        </p:nvSpPr>
+        <p:spPr/>
+        <p:txBody>
+          <a:bodyPr/>
+          <a:lstStyle/>
+          <a:p>
+            <a:r>
+              <a:rPr lang="en-CA" dirty="0"/>
+              <a:t>When will I need to use this?</a:t>
+            </a:r>
+          </a:p>
+        </p:txBody>
+      </p:sp>
+      <p:sp>
+        <p:nvSpPr>
+          <p:cNvPr id="3" name="Content Placeholder 2">
+            <a:extLst>
+              <a:ext uri="{FF2B5EF4-FFF2-40B4-BE49-F238E27FC236}">
+                <a16:creationId xmlns:a16="http://schemas.microsoft.com/office/drawing/2014/main" id="{A89D0808-2749-4E11-8462-B863E6302136}"/>
+              </a:ext>
+            </a:extLst>
+          </p:cNvPr>
+          <p:cNvSpPr>
+            <a:spLocks noGrp="1"/>
+          </p:cNvSpPr>
+          <p:nvPr>
+            <p:ph idx="1"/>
+          </p:nvPr>
+        </p:nvSpPr>
+        <p:spPr/>
+        <p:txBody>
+          <a:bodyPr/>
+          <a:lstStyle/>
+          <a:p>
+            <a:r>
+              <a:rPr lang="en-CA" dirty="0"/>
+              <a:t>Ex: HC-05 Bluetooth module:</a:t>
+            </a:r>
+          </a:p>
+          <a:p>
+            <a:r>
+              <a:rPr lang="en-CA" dirty="0"/>
+              <a:t>The RX pin for this module is rated for 3.3V</a:t>
+            </a:r>
+          </a:p>
+          <a:p>
+            <a:pPr lvl="1"/>
+            <a:r>
+              <a:rPr lang="en-CA" dirty="0"/>
+              <a:t>The Arduino pins can only output 5V</a:t>
+            </a:r>
+          </a:p>
+          <a:p>
+            <a:pPr lvl="2"/>
+            <a:r>
+              <a:rPr lang="en-CA" dirty="0"/>
+              <a:t>Need a voltage divider to turn the 5V into 3.3V</a:t>
+            </a:r>
+          </a:p>
+          <a:p>
+            <a:endParaRPr lang="en-CA" dirty="0"/>
+          </a:p>
+          <a:p>
+            <a:endParaRPr lang="en-CA" dirty="0"/>
+          </a:p>
+          <a:p>
+            <a:pPr marL="0" indent="0">
+              <a:buNone/>
+            </a:pPr>
+            <a:r>
+              <a:rPr lang="en-CA" b="1" dirty="0"/>
+              <a:t>exercise: What resistor ratio would give us the right voltage at the RX pin?</a:t>
+            </a:r>
+          </a:p>
+        </p:txBody>
+      </p:sp>
+    </p:spTree>
+    <p:extLst>
+      <p:ext uri="{BB962C8B-B14F-4D97-AF65-F5344CB8AC3E}">
+        <p14:creationId xmlns:p14="http://schemas.microsoft.com/office/powerpoint/2010/main" val="3246355353"/>
+      </p:ext>
+    </p:extLst>
+  </p:cSld>
+  <p:clrMapOvr>
+    <a:masterClrMapping/>
+  </p:clrMapOvr>
+</p:sld>
+</file>
+
+<file path=ppt/slides/slide11.xml><?xml version="1.0" encoding="utf-8"?>
+<p:sld xmlns:a="http://schemas.openxmlformats.org/drawingml/2006/main" xmlns:r="http://schemas.openxmlformats.org/officeDocument/2006/relationships" xmlns:p="http://schemas.openxmlformats.org/presentationml/2006/main">
+  <p:cSld>
+    <p:spTree>
+      <p:nvGrpSpPr>
+        <p:cNvPr id="1" name=""/>
+        <p:cNvGrpSpPr/>
+        <p:nvPr/>
+      </p:nvGrpSpPr>
+      <p:grpSpPr>
+        <a:xfrm>
+          <a:off x="0" y="0"/>
+          <a:ext cx="0" cy="0"/>
+          <a:chOff x="0" y="0"/>
+          <a:chExt cx="0" cy="0"/>
+        </a:xfrm>
+      </p:grpSpPr>
+      <p:sp>
+        <p:nvSpPr>
+          <p:cNvPr id="2" name="Title 1">
+            <a:extLst>
+              <a:ext uri="{FF2B5EF4-FFF2-40B4-BE49-F238E27FC236}">
+                <a16:creationId xmlns:a16="http://schemas.microsoft.com/office/drawing/2014/main" id="{2179302D-0941-48DE-B89D-EA55998FA9C7}"/>
+              </a:ext>
+            </a:extLst>
+          </p:cNvPr>
+          <p:cNvSpPr>
+            <a:spLocks noGrp="1"/>
+          </p:cNvSpPr>
+          <p:nvPr>
+            <p:ph type="title"/>
+          </p:nvPr>
+        </p:nvSpPr>
+        <p:spPr/>
+        <p:txBody>
+          <a:bodyPr/>
+          <a:lstStyle/>
+          <a:p>
+            <a:r>
+              <a:rPr lang="en-CA" dirty="0"/>
+              <a:t>Useful component: Diodes</a:t>
+            </a:r>
+          </a:p>
+        </p:txBody>
+      </p:sp>
+      <p:sp>
+        <p:nvSpPr>
+          <p:cNvPr id="3" name="Content Placeholder 2">
+            <a:extLst>
+              <a:ext uri="{FF2B5EF4-FFF2-40B4-BE49-F238E27FC236}">
+                <a16:creationId xmlns:a16="http://schemas.microsoft.com/office/drawing/2014/main" id="{12B7D4A2-8053-46E5-BE5B-AEA26E954312}"/>
+              </a:ext>
+            </a:extLst>
+          </p:cNvPr>
+          <p:cNvSpPr>
+            <a:spLocks noGrp="1"/>
+          </p:cNvSpPr>
+          <p:nvPr>
+            <p:ph idx="1"/>
+          </p:nvPr>
+        </p:nvSpPr>
+        <p:spPr>
+          <a:xfrm>
+            <a:off x="838200" y="1719788"/>
+            <a:ext cx="8404274" cy="4269544"/>
+          </a:xfrm>
+        </p:spPr>
+        <p:txBody>
+          <a:bodyPr>
+            <a:normAutofit lnSpcReduction="10000"/>
+          </a:bodyPr>
+          <a:lstStyle/>
+          <a:p>
+            <a:r>
+              <a:rPr lang="en-CA" dirty="0"/>
+              <a:t>One way valve: Allows current to travel freely in one direction, but not in the other</a:t>
+            </a:r>
+          </a:p>
+          <a:p>
+            <a:pPr lvl="1"/>
+            <a:r>
+              <a:rPr lang="en-CA" dirty="0"/>
+              <a:t>Used to protect circuit from connecting a power source backwards</a:t>
+            </a:r>
+          </a:p>
+          <a:p>
+            <a:pPr lvl="1"/>
+            <a:r>
+              <a:rPr lang="en-CA" dirty="0"/>
+              <a:t>Used to protect circuit from back EMF</a:t>
+            </a:r>
+          </a:p>
+          <a:p>
+            <a:pPr lvl="1"/>
+            <a:r>
+              <a:rPr lang="en-CA" dirty="0"/>
+              <a:t>Used to transform AC to DC (</a:t>
+            </a:r>
+            <a:r>
+              <a:rPr lang="en-CA" dirty="0" err="1"/>
+              <a:t>e.g</a:t>
+            </a:r>
+            <a:r>
+              <a:rPr lang="en-CA" dirty="0"/>
+              <a:t>: full bridge rectifier)</a:t>
+            </a:r>
+          </a:p>
+          <a:p>
+            <a:pPr lvl="1"/>
+            <a:endParaRPr lang="en-CA" dirty="0"/>
+          </a:p>
+          <a:p>
+            <a:pPr lvl="1"/>
+            <a:endParaRPr lang="en-CA" dirty="0"/>
+          </a:p>
+          <a:p>
+            <a:pPr lvl="1"/>
+            <a:endParaRPr lang="en-CA" dirty="0"/>
+          </a:p>
+          <a:p>
+            <a:pPr lvl="1"/>
+            <a:r>
+              <a:rPr lang="en-CA" dirty="0"/>
+              <a:t>There are different types.</a:t>
+            </a:r>
+          </a:p>
+          <a:p>
+            <a:pPr lvl="2"/>
+            <a:r>
+              <a:rPr lang="en-CA" dirty="0"/>
+              <a:t>Can find list on </a:t>
+            </a:r>
+            <a:r>
+              <a:rPr lang="en-CA" dirty="0">
+                <a:hlinkClick r:id="rId2"/>
+              </a:rPr>
+              <a:t>GitHub Common Circuits folder</a:t>
+            </a:r>
+            <a:endParaRPr lang="en-CA" dirty="0"/>
+          </a:p>
+        </p:txBody>
+      </p:sp>
+      <p:pic>
+        <p:nvPicPr>
+          <p:cNvPr id="1026" name="Picture 2" descr="Image result for diode&quot;">
+            <a:extLst>
+              <a:ext uri="{FF2B5EF4-FFF2-40B4-BE49-F238E27FC236}">
+                <a16:creationId xmlns:a16="http://schemas.microsoft.com/office/drawing/2014/main" id="{8C1E8E76-F0A6-496D-9202-2F636DA7935B}"/>
+              </a:ext>
+            </a:extLst>
+          </p:cNvPr>
+          <p:cNvPicPr>
+            <a:picLocks noChangeAspect="1" noChangeArrowheads="1"/>
+          </p:cNvPicPr>
+          <p:nvPr/>
+        </p:nvPicPr>
+        <p:blipFill>
+          <a:blip r:embed="rId3">
+            <a:extLst>
+              <a:ext uri="{28A0092B-C50C-407E-A947-70E740481C1C}">
+                <a14:useLocalDpi xmlns:a14="http://schemas.microsoft.com/office/drawing/2010/main" val="0"/>
+              </a:ext>
+            </a:extLst>
+          </a:blip>
+          <a:srcRect/>
+          <a:stretch>
+            <a:fillRect/>
+          </a:stretch>
+        </p:blipFill>
+        <p:spPr bwMode="auto">
+          <a:xfrm>
+            <a:off x="9444111" y="2518130"/>
+            <a:ext cx="1781907" cy="1336430"/>
+          </a:xfrm>
+          <a:prstGeom prst="rect">
+            <a:avLst/>
+          </a:prstGeom>
+          <a:noFill/>
+          <a:extLst>
+            <a:ext uri="{909E8E84-426E-40DD-AFC4-6F175D3DCCD1}">
+              <a14:hiddenFill xmlns:a14="http://schemas.microsoft.com/office/drawing/2010/main">
+                <a:solidFill>
+                  <a:srgbClr val="FFFFFF"/>
+                </a:solidFill>
+              </a14:hiddenFill>
+            </a:ext>
+          </a:extLst>
+        </p:spPr>
+      </p:pic>
+    </p:spTree>
+    <p:extLst>
+      <p:ext uri="{BB962C8B-B14F-4D97-AF65-F5344CB8AC3E}">
+        <p14:creationId xmlns:p14="http://schemas.microsoft.com/office/powerpoint/2010/main" val="438790139"/>
+      </p:ext>
+    </p:extLst>
+  </p:cSld>
+  <p:clrMapOvr>
+    <a:masterClrMapping/>
+  </p:clrMapOvr>
+</p:sld>
+</file>
+
 <file path=ppt/slides/slide2.xml><?xml version="1.0" encoding="utf-8"?>
 <p:sld xmlns:a="http://schemas.openxmlformats.org/drawingml/2006/main" xmlns:r="http://schemas.openxmlformats.org/officeDocument/2006/relationships" xmlns:p="http://schemas.openxmlformats.org/presentationml/2006/main">
   <p:cSld>
@@ -3596,7 +4083,9 @@
         </p:nvSpPr>
         <p:spPr/>
         <p:txBody>
-          <a:bodyPr/>
+          <a:bodyPr>
+            <a:normAutofit lnSpcReduction="10000"/>
+          </a:bodyPr>
           <a:lstStyle/>
           <a:p>
             <a:r>
@@ -3621,8 +4110,12 @@
             <a:pPr lvl="1"/>
             <a:r>
               <a:rPr lang="en-CA" dirty="0"/>
-              <a:t>“Kinetic energy, in some sense”</a:t>
-            </a:r>
+              <a:t>“Kinetic energy”, in some sense</a:t>
+            </a:r>
+          </a:p>
+          <a:p>
+            <a:pPr lvl="1"/>
+            <a:endParaRPr lang="en-CA" dirty="0"/>
           </a:p>
           <a:p>
             <a:r>
@@ -3650,6 +4143,10 @@
               <a:rPr lang="en-CA" dirty="0"/>
               <a:t>R = resistance	Ohms: [Ω]</a:t>
             </a:r>
+          </a:p>
+          <a:p>
+            <a:pPr lvl="1"/>
+            <a:endParaRPr lang="en-CA" dirty="0"/>
           </a:p>
           <a:p>
             <a:r>
@@ -3739,7 +4236,7 @@
         <p:spPr/>
         <p:txBody>
           <a:bodyPr>
-            <a:normAutofit fontScale="92500" lnSpcReduction="20000"/>
+            <a:normAutofit/>
           </a:bodyPr>
           <a:lstStyle/>
           <a:p>
@@ -3766,58 +4263,6 @@
             <a:r>
               <a:rPr lang="en-CA" dirty="0"/>
               <a:t>[insert example image]</a:t>
-            </a:r>
-          </a:p>
-          <a:p>
-            <a:r>
-              <a:rPr lang="en-CA" dirty="0"/>
-              <a:t>Series and Parallel</a:t>
-            </a:r>
-          </a:p>
-          <a:p>
-            <a:pPr lvl="1"/>
-            <a:r>
-              <a:rPr lang="en-CA" dirty="0"/>
-              <a:t>Components can be connected in series (one passage for current to flow)</a:t>
-            </a:r>
-          </a:p>
-          <a:p>
-            <a:pPr lvl="1"/>
-            <a:r>
-              <a:rPr lang="en-CA" dirty="0"/>
-              <a:t>Or parallel (multiple passages for current to flow)</a:t>
-            </a:r>
-          </a:p>
-          <a:p>
-            <a:pPr lvl="2"/>
-            <a:r>
-              <a:rPr lang="en-CA" dirty="0"/>
-              <a:t>[insert example image]</a:t>
-            </a:r>
-          </a:p>
-          <a:p>
-            <a:r>
-              <a:rPr lang="en-CA" dirty="0"/>
-              <a:t>Voltage is the same for all branches in parallel, but not branches in series</a:t>
-            </a:r>
-          </a:p>
-          <a:p>
-            <a:r>
-              <a:rPr lang="en-CA" dirty="0"/>
-              <a:t>Current is the same for all branches in series, but not branches in parallel</a:t>
-            </a:r>
-          </a:p>
-          <a:p>
-            <a:r>
-              <a:rPr lang="en-CA" dirty="0"/>
-              <a:t>These facts hold true no matter how complex the circuit is.</a:t>
-            </a:r>
-          </a:p>
-          <a:p>
-            <a:pPr lvl="1"/>
-            <a:r>
-              <a:rPr lang="en-CA" dirty="0"/>
-              <a:t>As long as there are no dependent sources (Op-Amps)</a:t>
             </a:r>
           </a:p>
         </p:txBody>
@@ -3857,7 +4302,7 @@
           <p:cNvPr id="2" name="Title 1">
             <a:extLst>
               <a:ext uri="{FF2B5EF4-FFF2-40B4-BE49-F238E27FC236}">
-                <a16:creationId xmlns:a16="http://schemas.microsoft.com/office/drawing/2014/main" id="{F20C2503-84A2-4F21-9DB3-15889019898E}"/>
+                <a16:creationId xmlns:a16="http://schemas.microsoft.com/office/drawing/2014/main" id="{F5BDE49D-AFB7-4677-86D9-4EEF15426684}"/>
               </a:ext>
             </a:extLst>
           </p:cNvPr>
@@ -3874,181 +4319,395 @@
           <a:lstStyle/>
           <a:p>
             <a:r>
-              <a:rPr lang="en-US" dirty="0"/>
-              <a:t>Basics of circuit analysis: simplifying circuits</a:t>
-            </a:r>
-            <a:br>
-              <a:rPr lang="en-US" dirty="0"/>
-            </a:br>
+              <a:rPr lang="en-CA" dirty="0"/>
+              <a:t>Schematic representation</a:t>
+            </a:r>
+          </a:p>
+        </p:txBody>
+      </p:sp>
+      <p:sp>
+        <p:nvSpPr>
+          <p:cNvPr id="3" name="Content Placeholder 2">
+            <a:extLst>
+              <a:ext uri="{FF2B5EF4-FFF2-40B4-BE49-F238E27FC236}">
+                <a16:creationId xmlns:a16="http://schemas.microsoft.com/office/drawing/2014/main" id="{0811AA22-F724-4F2E-A98F-11FA39C079A5}"/>
+              </a:ext>
+            </a:extLst>
+          </p:cNvPr>
+          <p:cNvSpPr>
+            <a:spLocks noGrp="1"/>
+          </p:cNvSpPr>
+          <p:nvPr>
+            <p:ph idx="1"/>
+          </p:nvPr>
+        </p:nvSpPr>
+        <p:spPr/>
+        <p:txBody>
+          <a:bodyPr/>
+          <a:lstStyle/>
+          <a:p>
+            <a:r>
+              <a:rPr lang="en-CA" dirty="0"/>
+              <a:t>Resistor:</a:t>
+            </a:r>
+          </a:p>
+          <a:p>
             <a:endParaRPr lang="en-CA" dirty="0"/>
           </a:p>
-        </p:txBody>
-      </p:sp>
-      <p:sp>
-        <p:nvSpPr>
-          <p:cNvPr id="3" name="Content Placeholder 2">
-            <a:extLst>
-              <a:ext uri="{FF2B5EF4-FFF2-40B4-BE49-F238E27FC236}">
-                <a16:creationId xmlns:a16="http://schemas.microsoft.com/office/drawing/2014/main" id="{DC76183D-B9E8-47AD-9873-66F08644F81E}"/>
-              </a:ext>
-            </a:extLst>
-          </p:cNvPr>
-          <p:cNvSpPr>
-            <a:spLocks noGrp="1"/>
-          </p:cNvSpPr>
-          <p:nvPr>
-            <p:ph idx="1"/>
-          </p:nvPr>
-        </p:nvSpPr>
-        <p:spPr/>
-        <p:txBody>
-          <a:bodyPr>
-            <a:normAutofit fontScale="92500" lnSpcReduction="10000"/>
-          </a:bodyPr>
-          <a:lstStyle/>
+          <a:p>
+            <a:endParaRPr lang="en-CA" dirty="0"/>
+          </a:p>
           <a:p>
             <a:r>
               <a:rPr lang="en-CA" dirty="0"/>
-              <a:t>Resistors:</a:t>
-            </a:r>
-          </a:p>
-          <a:p>
-            <a:pPr lvl="1"/>
+              <a:t>Capacitor:</a:t>
+            </a:r>
+          </a:p>
+          <a:p>
+            <a:endParaRPr lang="en-CA" dirty="0"/>
+          </a:p>
+          <a:p>
+            <a:endParaRPr lang="en-CA" dirty="0"/>
+          </a:p>
+          <a:p>
             <a:r>
               <a:rPr lang="en-CA" dirty="0"/>
-              <a:t>Series: Req = R1+R2</a:t>
-            </a:r>
-          </a:p>
-          <a:p>
-            <a:pPr lvl="1"/>
-            <a:r>
-              <a:rPr lang="en-CA" dirty="0"/>
-              <a:t>Parallel: Req = 1/(1/R1 + 1/R2)</a:t>
-            </a:r>
-          </a:p>
-          <a:p>
-            <a:pPr lvl="1"/>
-            <a:r>
-              <a:rPr lang="en-CA" dirty="0"/>
-              <a:t>[add </a:t>
-            </a:r>
-            <a:r>
-              <a:rPr lang="en-CA" dirty="0" err="1"/>
-              <a:t>img</a:t>
-            </a:r>
-            <a:r>
-              <a:rPr lang="en-CA" dirty="0"/>
-              <a:t>]</a:t>
-            </a:r>
-          </a:p>
-          <a:p>
-            <a:r>
-              <a:rPr lang="en-CA" dirty="0"/>
-              <a:t>Capacitors:</a:t>
-            </a:r>
-          </a:p>
-          <a:p>
-            <a:pPr lvl="1"/>
-            <a:r>
-              <a:rPr lang="en-CA" dirty="0"/>
-              <a:t>Series: </a:t>
-            </a:r>
-            <a:r>
-              <a:rPr lang="en-CA" dirty="0" err="1"/>
-              <a:t>Ceq</a:t>
-            </a:r>
-            <a:r>
-              <a:rPr lang="en-CA" dirty="0"/>
-              <a:t> = 1/(1/C1 + 1/C2) </a:t>
-            </a:r>
-          </a:p>
-          <a:p>
-            <a:pPr lvl="1"/>
-            <a:r>
-              <a:rPr lang="en-CA" dirty="0"/>
-              <a:t>Parallel: </a:t>
-            </a:r>
-            <a:r>
-              <a:rPr lang="en-CA" dirty="0" err="1"/>
-              <a:t>Ceq</a:t>
-            </a:r>
-            <a:r>
-              <a:rPr lang="en-CA" dirty="0"/>
-              <a:t> = C1+C2</a:t>
-            </a:r>
-          </a:p>
-          <a:p>
-            <a:pPr lvl="1"/>
-            <a:r>
-              <a:rPr lang="en-CA" dirty="0"/>
-              <a:t>[add </a:t>
-            </a:r>
-            <a:r>
-              <a:rPr lang="en-CA" dirty="0" err="1"/>
-              <a:t>img</a:t>
-            </a:r>
-            <a:r>
-              <a:rPr lang="en-CA" dirty="0"/>
-              <a:t>]</a:t>
-            </a:r>
-          </a:p>
-          <a:p>
-            <a:r>
-              <a:rPr lang="en-CA" dirty="0"/>
-              <a:t>Inductors:</a:t>
-            </a:r>
-          </a:p>
-          <a:p>
-            <a:pPr lvl="1"/>
-            <a:r>
-              <a:rPr lang="en-CA" dirty="0"/>
-              <a:t>Series: </a:t>
-            </a:r>
-            <a:r>
-              <a:rPr lang="en-CA" dirty="0" err="1"/>
-              <a:t>Ieq</a:t>
-            </a:r>
-            <a:r>
-              <a:rPr lang="en-CA" dirty="0"/>
-              <a:t> = I1+I2</a:t>
-            </a:r>
-          </a:p>
-          <a:p>
-            <a:pPr lvl="1"/>
-            <a:r>
-              <a:rPr lang="en-CA" dirty="0"/>
-              <a:t>Parallel: </a:t>
-            </a:r>
-            <a:r>
-              <a:rPr lang="en-CA" dirty="0" err="1"/>
-              <a:t>Ieq</a:t>
-            </a:r>
-            <a:r>
-              <a:rPr lang="en-CA" dirty="0"/>
-              <a:t> = 1/(1/I1 + 1/I2)</a:t>
-            </a:r>
-          </a:p>
-          <a:p>
-            <a:pPr lvl="1"/>
-            <a:r>
-              <a:rPr lang="en-CA" dirty="0"/>
-              <a:t>[add </a:t>
-            </a:r>
-            <a:r>
-              <a:rPr lang="en-CA" dirty="0" err="1"/>
-              <a:t>img</a:t>
-            </a:r>
-            <a:r>
-              <a:rPr lang="en-CA" dirty="0"/>
-              <a:t>]</a:t>
-            </a:r>
-          </a:p>
-        </p:txBody>
-      </p:sp>
+              <a:t>Inductor:</a:t>
+            </a:r>
+          </a:p>
+        </p:txBody>
+      </p:sp>
+      <mc:AlternateContent xmlns:mc="http://schemas.openxmlformats.org/markup-compatibility/2006">
+        <mc:Choice xmlns:p14="http://schemas.microsoft.com/office/powerpoint/2010/main" Requires="p14">
+          <p:contentPart p14:bwMode="auto" r:id="rId2">
+            <p14:nvContentPartPr>
+              <p14:cNvPr id="4" name="Ink 3">
+                <a:extLst>
+                  <a:ext uri="{FF2B5EF4-FFF2-40B4-BE49-F238E27FC236}">
+                    <a16:creationId xmlns:a16="http://schemas.microsoft.com/office/drawing/2014/main" id="{51551672-6BC6-4011-A344-EB01B8D92D3D}"/>
+                  </a:ext>
+                </a:extLst>
+              </p14:cNvPr>
+              <p14:cNvContentPartPr/>
+              <p14:nvPr/>
+            </p14:nvContentPartPr>
+            <p14:xfrm>
+              <a:off x="2948888" y="2043000"/>
+              <a:ext cx="2815200" cy="437760"/>
+            </p14:xfrm>
+          </p:contentPart>
+        </mc:Choice>
+        <mc:Fallback>
+          <p:pic>
+            <p:nvPicPr>
+              <p:cNvPr id="4" name="Ink 3">
+                <a:extLst>
+                  <a:ext uri="{FF2B5EF4-FFF2-40B4-BE49-F238E27FC236}">
+                    <a16:creationId xmlns:a16="http://schemas.microsoft.com/office/drawing/2014/main" id="{51551672-6BC6-4011-A344-EB01B8D92D3D}"/>
+                  </a:ext>
+                </a:extLst>
+              </p:cNvPr>
+              <p:cNvPicPr/>
+              <p:nvPr/>
+            </p:nvPicPr>
+            <p:blipFill>
+              <a:blip r:embed="rId3"/>
+              <a:stretch>
+                <a:fillRect/>
+              </a:stretch>
+            </p:blipFill>
+            <p:spPr>
+              <a:xfrm>
+                <a:off x="2931248" y="2025360"/>
+                <a:ext cx="2850840" cy="473400"/>
+              </a:xfrm>
+              <a:prstGeom prst="rect">
+                <a:avLst/>
+              </a:prstGeom>
+            </p:spPr>
+          </p:pic>
+        </mc:Fallback>
+      </mc:AlternateContent>
+      <p:grpSp>
+        <p:nvGrpSpPr>
+          <p:cNvPr id="10" name="Group 9">
+            <a:extLst>
+              <a:ext uri="{FF2B5EF4-FFF2-40B4-BE49-F238E27FC236}">
+                <a16:creationId xmlns:a16="http://schemas.microsoft.com/office/drawing/2014/main" id="{FCFFC175-ED5D-4F68-A56B-B103E44D5662}"/>
+              </a:ext>
+            </a:extLst>
+          </p:cNvPr>
+          <p:cNvGrpSpPr/>
+          <p:nvPr/>
+        </p:nvGrpSpPr>
+        <p:grpSpPr>
+          <a:xfrm>
+            <a:off x="3275009" y="3505371"/>
+            <a:ext cx="2478600" cy="702000"/>
+            <a:chOff x="3275009" y="3505371"/>
+            <a:chExt cx="2478600" cy="702000"/>
+          </a:xfrm>
+        </p:grpSpPr>
+        <mc:AlternateContent xmlns:mc="http://schemas.openxmlformats.org/markup-compatibility/2006">
+          <mc:Choice xmlns:p14="http://schemas.microsoft.com/office/powerpoint/2010/main" Requires="p14">
+            <p:contentPart p14:bwMode="auto" r:id="rId4">
+              <p14:nvContentPartPr>
+                <p14:cNvPr id="5" name="Ink 4">
+                  <a:extLst>
+                    <a:ext uri="{FF2B5EF4-FFF2-40B4-BE49-F238E27FC236}">
+                      <a16:creationId xmlns:a16="http://schemas.microsoft.com/office/drawing/2014/main" id="{F52BD4AB-0567-4555-B2AD-676A9E7AEEA5}"/>
+                    </a:ext>
+                  </a:extLst>
+                </p14:cNvPr>
+                <p14:cNvContentPartPr/>
+                <p14:nvPr/>
+              </p14:nvContentPartPr>
+              <p14:xfrm>
+                <a:off x="3275009" y="3930171"/>
+                <a:ext cx="716400" cy="12960"/>
+              </p14:xfrm>
+            </p:contentPart>
+          </mc:Choice>
+          <mc:Fallback>
+            <p:pic>
+              <p:nvPicPr>
+                <p:cNvPr id="5" name="Ink 4">
+                  <a:extLst>
+                    <a:ext uri="{FF2B5EF4-FFF2-40B4-BE49-F238E27FC236}">
+                      <a16:creationId xmlns:a16="http://schemas.microsoft.com/office/drawing/2014/main" id="{F52BD4AB-0567-4555-B2AD-676A9E7AEEA5}"/>
+                    </a:ext>
+                  </a:extLst>
+                </p:cNvPr>
+                <p:cNvPicPr/>
+                <p:nvPr/>
+              </p:nvPicPr>
+              <p:blipFill>
+                <a:blip r:embed="rId5"/>
+                <a:stretch>
+                  <a:fillRect/>
+                </a:stretch>
+              </p:blipFill>
+              <p:spPr>
+                <a:xfrm>
+                  <a:off x="3257009" y="3912531"/>
+                  <a:ext cx="752040" cy="48600"/>
+                </a:xfrm>
+                <a:prstGeom prst="rect">
+                  <a:avLst/>
+                </a:prstGeom>
+              </p:spPr>
+            </p:pic>
+          </mc:Fallback>
+        </mc:AlternateContent>
+        <mc:AlternateContent xmlns:mc="http://schemas.openxmlformats.org/markup-compatibility/2006">
+          <mc:Choice xmlns:p14="http://schemas.microsoft.com/office/powerpoint/2010/main" Requires="p14">
+            <p:contentPart p14:bwMode="auto" r:id="rId6">
+              <p14:nvContentPartPr>
+                <p14:cNvPr id="6" name="Ink 5">
+                  <a:extLst>
+                    <a:ext uri="{FF2B5EF4-FFF2-40B4-BE49-F238E27FC236}">
+                      <a16:creationId xmlns:a16="http://schemas.microsoft.com/office/drawing/2014/main" id="{961C5126-B7AB-4C04-A519-06F03F0A08F0}"/>
+                    </a:ext>
+                  </a:extLst>
+                </p14:cNvPr>
+                <p14:cNvContentPartPr/>
+                <p14:nvPr/>
+              </p14:nvContentPartPr>
+              <p14:xfrm>
+                <a:off x="4079609" y="3542451"/>
+                <a:ext cx="15120" cy="664920"/>
+              </p14:xfrm>
+            </p:contentPart>
+          </mc:Choice>
+          <mc:Fallback>
+            <p:pic>
+              <p:nvPicPr>
+                <p:cNvPr id="6" name="Ink 5">
+                  <a:extLst>
+                    <a:ext uri="{FF2B5EF4-FFF2-40B4-BE49-F238E27FC236}">
+                      <a16:creationId xmlns:a16="http://schemas.microsoft.com/office/drawing/2014/main" id="{961C5126-B7AB-4C04-A519-06F03F0A08F0}"/>
+                    </a:ext>
+                  </a:extLst>
+                </p:cNvPr>
+                <p:cNvPicPr/>
+                <p:nvPr/>
+              </p:nvPicPr>
+              <p:blipFill>
+                <a:blip r:embed="rId7"/>
+                <a:stretch>
+                  <a:fillRect/>
+                </a:stretch>
+              </p:blipFill>
+              <p:spPr>
+                <a:xfrm>
+                  <a:off x="4061969" y="3524451"/>
+                  <a:ext cx="50760" cy="700560"/>
+                </a:xfrm>
+                <a:prstGeom prst="rect">
+                  <a:avLst/>
+                </a:prstGeom>
+              </p:spPr>
+            </p:pic>
+          </mc:Fallback>
+        </mc:AlternateContent>
+        <mc:AlternateContent xmlns:mc="http://schemas.openxmlformats.org/markup-compatibility/2006">
+          <mc:Choice xmlns:p14="http://schemas.microsoft.com/office/powerpoint/2010/main" Requires="p14">
+            <p:contentPart p14:bwMode="auto" r:id="rId8">
+              <p14:nvContentPartPr>
+                <p14:cNvPr id="7" name="Ink 6">
+                  <a:extLst>
+                    <a:ext uri="{FF2B5EF4-FFF2-40B4-BE49-F238E27FC236}">
+                      <a16:creationId xmlns:a16="http://schemas.microsoft.com/office/drawing/2014/main" id="{B5B2AC99-0A6B-4BA6-8DFF-9701709B87C7}"/>
+                    </a:ext>
+                  </a:extLst>
+                </p14:cNvPr>
+                <p14:cNvContentPartPr/>
+                <p14:nvPr/>
+              </p14:nvContentPartPr>
+              <p14:xfrm>
+                <a:off x="4710329" y="3505371"/>
+                <a:ext cx="20160" cy="667800"/>
+              </p14:xfrm>
+            </p:contentPart>
+          </mc:Choice>
+          <mc:Fallback>
+            <p:pic>
+              <p:nvPicPr>
+                <p:cNvPr id="7" name="Ink 6">
+                  <a:extLst>
+                    <a:ext uri="{FF2B5EF4-FFF2-40B4-BE49-F238E27FC236}">
+                      <a16:creationId xmlns:a16="http://schemas.microsoft.com/office/drawing/2014/main" id="{B5B2AC99-0A6B-4BA6-8DFF-9701709B87C7}"/>
+                    </a:ext>
+                  </a:extLst>
+                </p:cNvPr>
+                <p:cNvPicPr/>
+                <p:nvPr/>
+              </p:nvPicPr>
+              <p:blipFill>
+                <a:blip r:embed="rId9"/>
+                <a:stretch>
+                  <a:fillRect/>
+                </a:stretch>
+              </p:blipFill>
+              <p:spPr>
+                <a:xfrm>
+                  <a:off x="4692329" y="3487371"/>
+                  <a:ext cx="55800" cy="703440"/>
+                </a:xfrm>
+                <a:prstGeom prst="rect">
+                  <a:avLst/>
+                </a:prstGeom>
+              </p:spPr>
+            </p:pic>
+          </mc:Fallback>
+        </mc:AlternateContent>
+        <mc:AlternateContent xmlns:mc="http://schemas.openxmlformats.org/markup-compatibility/2006">
+          <mc:Choice xmlns:p14="http://schemas.microsoft.com/office/powerpoint/2010/main" Requires="p14">
+            <p:contentPart p14:bwMode="auto" r:id="rId10">
+              <p14:nvContentPartPr>
+                <p14:cNvPr id="9" name="Ink 8">
+                  <a:extLst>
+                    <a:ext uri="{FF2B5EF4-FFF2-40B4-BE49-F238E27FC236}">
+                      <a16:creationId xmlns:a16="http://schemas.microsoft.com/office/drawing/2014/main" id="{1D7294C0-CD3B-43A9-A29E-D85AD6B7F728}"/>
+                    </a:ext>
+                  </a:extLst>
+                </p14:cNvPr>
+                <p14:cNvContentPartPr/>
+                <p14:nvPr/>
+              </p14:nvContentPartPr>
+              <p14:xfrm>
+                <a:off x="4748129" y="3847731"/>
+                <a:ext cx="1005480" cy="70560"/>
+              </p14:xfrm>
+            </p:contentPart>
+          </mc:Choice>
+          <mc:Fallback>
+            <p:pic>
+              <p:nvPicPr>
+                <p:cNvPr id="9" name="Ink 8">
+                  <a:extLst>
+                    <a:ext uri="{FF2B5EF4-FFF2-40B4-BE49-F238E27FC236}">
+                      <a16:creationId xmlns:a16="http://schemas.microsoft.com/office/drawing/2014/main" id="{1D7294C0-CD3B-43A9-A29E-D85AD6B7F728}"/>
+                    </a:ext>
+                  </a:extLst>
+                </p:cNvPr>
+                <p:cNvPicPr/>
+                <p:nvPr/>
+              </p:nvPicPr>
+              <p:blipFill>
+                <a:blip r:embed="rId11"/>
+                <a:stretch>
+                  <a:fillRect/>
+                </a:stretch>
+              </p:blipFill>
+              <p:spPr>
+                <a:xfrm>
+                  <a:off x="4730129" y="3830091"/>
+                  <a:ext cx="1041120" cy="106200"/>
+                </a:xfrm>
+                <a:prstGeom prst="rect">
+                  <a:avLst/>
+                </a:prstGeom>
+              </p:spPr>
+            </p:pic>
+          </mc:Fallback>
+        </mc:AlternateContent>
+      </p:grpSp>
+      <mc:AlternateContent xmlns:mc="http://schemas.openxmlformats.org/markup-compatibility/2006">
+        <mc:Choice xmlns:p14="http://schemas.microsoft.com/office/powerpoint/2010/main" Requires="p14">
+          <p:contentPart p14:bwMode="auto" r:id="rId12">
+            <p14:nvContentPartPr>
+              <p14:cNvPr id="11" name="Ink 10">
+                <a:extLst>
+                  <a:ext uri="{FF2B5EF4-FFF2-40B4-BE49-F238E27FC236}">
+                    <a16:creationId xmlns:a16="http://schemas.microsoft.com/office/drawing/2014/main" id="{D7D31247-899C-45A0-84AD-BB5502D46E1D}"/>
+                  </a:ext>
+                </a:extLst>
+              </p14:cNvPr>
+              <p14:cNvContentPartPr/>
+              <p14:nvPr/>
+            </p14:nvContentPartPr>
+            <p14:xfrm>
+              <a:off x="2982471" y="5420600"/>
+              <a:ext cx="3375720" cy="441000"/>
+            </p14:xfrm>
+          </p:contentPart>
+        </mc:Choice>
+        <mc:Fallback>
+          <p:pic>
+            <p:nvPicPr>
+              <p:cNvPr id="11" name="Ink 10">
+                <a:extLst>
+                  <a:ext uri="{FF2B5EF4-FFF2-40B4-BE49-F238E27FC236}">
+                    <a16:creationId xmlns:a16="http://schemas.microsoft.com/office/drawing/2014/main" id="{D7D31247-899C-45A0-84AD-BB5502D46E1D}"/>
+                  </a:ext>
+                </a:extLst>
+              </p:cNvPr>
+              <p:cNvPicPr/>
+              <p:nvPr/>
+            </p:nvPicPr>
+            <p:blipFill>
+              <a:blip r:embed="rId13"/>
+              <a:stretch>
+                <a:fillRect/>
+              </a:stretch>
+            </p:blipFill>
+            <p:spPr>
+              <a:xfrm>
+                <a:off x="2964831" y="5402960"/>
+                <a:ext cx="3411360" cy="476640"/>
+              </a:xfrm>
+              <a:prstGeom prst="rect">
+                <a:avLst/>
+              </a:prstGeom>
+            </p:spPr>
+          </p:pic>
+        </mc:Fallback>
+      </mc:AlternateContent>
     </p:spTree>
     <p:extLst>
       <p:ext uri="{BB962C8B-B14F-4D97-AF65-F5344CB8AC3E}">
-        <p14:creationId xmlns:p14="http://schemas.microsoft.com/office/powerpoint/2010/main" val="2135196795"/>
+        <p14:creationId xmlns:p14="http://schemas.microsoft.com/office/powerpoint/2010/main" val="3358264552"/>
       </p:ext>
     </p:extLst>
   </p:cSld>
@@ -4077,64 +4736,144 @@
       </p:grpSpPr>
       <p:sp>
         <p:nvSpPr>
-          <p:cNvPr id="2" name="Title 1">
-            <a:extLst>
-              <a:ext uri="{FF2B5EF4-FFF2-40B4-BE49-F238E27FC236}">
-                <a16:creationId xmlns:a16="http://schemas.microsoft.com/office/drawing/2014/main" id="{749F9C11-5F07-43E9-8569-3EBE4E00B03A}"/>
-              </a:ext>
-            </a:extLst>
-          </p:cNvPr>
-          <p:cNvSpPr>
-            <a:spLocks noGrp="1"/>
-          </p:cNvSpPr>
-          <p:nvPr>
-            <p:ph type="title"/>
-          </p:nvPr>
-        </p:nvSpPr>
-        <p:spPr/>
+          <p:cNvPr id="7" name="Text Placeholder 6">
+            <a:extLst>
+              <a:ext uri="{FF2B5EF4-FFF2-40B4-BE49-F238E27FC236}">
+                <a16:creationId xmlns:a16="http://schemas.microsoft.com/office/drawing/2014/main" id="{F77FE05B-6B72-47BA-BF07-5DB37B07E3F7}"/>
+              </a:ext>
+            </a:extLst>
+          </p:cNvPr>
+          <p:cNvSpPr>
+            <a:spLocks noGrp="1"/>
+          </p:cNvSpPr>
+          <p:nvPr>
+            <p:ph type="body" idx="1"/>
+          </p:nvPr>
+        </p:nvSpPr>
+        <p:spPr>
+          <a:xfrm>
+            <a:off x="293273" y="1582689"/>
+            <a:ext cx="5157787" cy="823912"/>
+          </a:xfrm>
+        </p:spPr>
         <p:txBody>
           <a:bodyPr/>
           <a:lstStyle/>
           <a:p>
             <a:r>
               <a:rPr lang="en-CA" dirty="0"/>
-              <a:t>Exercise 1: Find the current</a:t>
-            </a:r>
-          </a:p>
-        </p:txBody>
-      </p:sp>
-      <p:sp>
-        <p:nvSpPr>
-          <p:cNvPr id="3" name="Content Placeholder 2">
-            <a:extLst>
-              <a:ext uri="{FF2B5EF4-FFF2-40B4-BE49-F238E27FC236}">
-                <a16:creationId xmlns:a16="http://schemas.microsoft.com/office/drawing/2014/main" id="{5DBA1501-045C-4142-9E3E-057ACED25BB6}"/>
-              </a:ext>
-            </a:extLst>
-          </p:cNvPr>
-          <p:cNvSpPr>
-            <a:spLocks noGrp="1"/>
-          </p:cNvSpPr>
-          <p:nvPr>
-            <p:ph idx="1"/>
-          </p:nvPr>
-        </p:nvSpPr>
-        <p:spPr/>
+              <a:t>Series: Current same for all components, Voltage different</a:t>
+            </a:r>
+          </a:p>
+        </p:txBody>
+      </p:sp>
+      <p:pic>
+        <p:nvPicPr>
+          <p:cNvPr id="15" name="Content Placeholder 14" descr="A picture containing table&#10;&#10;Description automatically generated">
+            <a:extLst>
+              <a:ext uri="{FF2B5EF4-FFF2-40B4-BE49-F238E27FC236}">
+                <a16:creationId xmlns:a16="http://schemas.microsoft.com/office/drawing/2014/main" id="{EF384E70-0237-49E9-BBF1-1F3505805182}"/>
+              </a:ext>
+            </a:extLst>
+          </p:cNvPr>
+          <p:cNvPicPr>
+            <a:picLocks noGrp="1" noChangeAspect="1"/>
+          </p:cNvPicPr>
+          <p:nvPr>
+            <p:ph sz="half" idx="2"/>
+          </p:nvPr>
+        </p:nvPicPr>
+        <p:blipFill>
+          <a:blip r:embed="rId2">
+            <a:extLst>
+              <a:ext uri="{28A0092B-C50C-407E-A947-70E740481C1C}">
+                <a14:useLocalDpi xmlns:a14="http://schemas.microsoft.com/office/drawing/2010/main" val="0"/>
+              </a:ext>
+            </a:extLst>
+          </a:blip>
+          <a:stretch>
+            <a:fillRect/>
+          </a:stretch>
+        </p:blipFill>
+        <p:spPr>
+          <a:xfrm>
+            <a:off x="293273" y="2943914"/>
+            <a:ext cx="5018190" cy="2818023"/>
+          </a:xfrm>
+        </p:spPr>
+      </p:pic>
+      <p:sp>
+        <p:nvSpPr>
+          <p:cNvPr id="8" name="Text Placeholder 7">
+            <a:extLst>
+              <a:ext uri="{FF2B5EF4-FFF2-40B4-BE49-F238E27FC236}">
+                <a16:creationId xmlns:a16="http://schemas.microsoft.com/office/drawing/2014/main" id="{AAF8A831-7A2F-4DB5-9368-5DCE99E46F94}"/>
+              </a:ext>
+            </a:extLst>
+          </p:cNvPr>
+          <p:cNvSpPr>
+            <a:spLocks noGrp="1"/>
+          </p:cNvSpPr>
+          <p:nvPr>
+            <p:ph type="body" sz="quarter" idx="3"/>
+          </p:nvPr>
+        </p:nvSpPr>
+        <p:spPr>
+          <a:xfrm>
+            <a:off x="7114736" y="1582689"/>
+            <a:ext cx="5183188" cy="823912"/>
+          </a:xfrm>
+        </p:spPr>
         <p:txBody>
           <a:bodyPr/>
           <a:lstStyle/>
           <a:p>
             <a:r>
               <a:rPr lang="en-CA" dirty="0"/>
-              <a:t>[Multiple simple R circuits w/ 1 resistor,  series, parallel, series + parallel]</a:t>
-            </a:r>
-          </a:p>
-        </p:txBody>
-      </p:sp>
+              <a:t>Parallel: Voltage same for all components, Current different</a:t>
+            </a:r>
+          </a:p>
+        </p:txBody>
+      </p:sp>
+      <p:pic>
+        <p:nvPicPr>
+          <p:cNvPr id="17" name="Content Placeholder 16" descr="A picture containing clock&#10;&#10;Description automatically generated">
+            <a:extLst>
+              <a:ext uri="{FF2B5EF4-FFF2-40B4-BE49-F238E27FC236}">
+                <a16:creationId xmlns:a16="http://schemas.microsoft.com/office/drawing/2014/main" id="{EAB7F70F-E1B0-49C3-87BB-1CF506D58301}"/>
+              </a:ext>
+            </a:extLst>
+          </p:cNvPr>
+          <p:cNvPicPr>
+            <a:picLocks noGrp="1" noChangeAspect="1"/>
+          </p:cNvPicPr>
+          <p:nvPr>
+            <p:ph sz="quarter" idx="4"/>
+          </p:nvPr>
+        </p:nvPicPr>
+        <p:blipFill>
+          <a:blip r:embed="rId3">
+            <a:extLst>
+              <a:ext uri="{28A0092B-C50C-407E-A947-70E740481C1C}">
+                <a14:useLocalDpi xmlns:a14="http://schemas.microsoft.com/office/drawing/2010/main" val="0"/>
+              </a:ext>
+            </a:extLst>
+          </a:blip>
+          <a:stretch>
+            <a:fillRect/>
+          </a:stretch>
+        </p:blipFill>
+        <p:spPr>
+          <a:xfrm>
+            <a:off x="6715539" y="2796550"/>
+            <a:ext cx="5183188" cy="3112749"/>
+          </a:xfrm>
+        </p:spPr>
+      </p:pic>
     </p:spTree>
     <p:extLst>
       <p:ext uri="{BB962C8B-B14F-4D97-AF65-F5344CB8AC3E}">
-        <p14:creationId xmlns:p14="http://schemas.microsoft.com/office/powerpoint/2010/main" val="1754141922"/>
+        <p14:creationId xmlns:p14="http://schemas.microsoft.com/office/powerpoint/2010/main" val="1158164764"/>
       </p:ext>
     </p:extLst>
   </p:cSld>
@@ -4166,7 +4905,7 @@
           <p:cNvPr id="2" name="Title 1">
             <a:extLst>
               <a:ext uri="{FF2B5EF4-FFF2-40B4-BE49-F238E27FC236}">
-                <a16:creationId xmlns:a16="http://schemas.microsoft.com/office/drawing/2014/main" id="{749F9C11-5F07-43E9-8569-3EBE4E00B03A}"/>
+                <a16:creationId xmlns:a16="http://schemas.microsoft.com/office/drawing/2014/main" id="{F20C2503-84A2-4F21-9DB3-15889019898E}"/>
               </a:ext>
             </a:extLst>
           </p:cNvPr>
@@ -4183,44 +4922,172 @@
           <a:lstStyle/>
           <a:p>
             <a:r>
+              <a:rPr lang="en-US"/>
+              <a:t>Basics of circuit analysis: simplifying circuits</a:t>
+            </a:r>
+            <a:br>
+              <a:rPr lang="en-US"/>
+            </a:br>
+            <a:endParaRPr lang="en-CA" dirty="0"/>
+          </a:p>
+        </p:txBody>
+      </p:sp>
+      <p:sp>
+        <p:nvSpPr>
+          <p:cNvPr id="3" name="Content Placeholder 2">
+            <a:extLst>
+              <a:ext uri="{FF2B5EF4-FFF2-40B4-BE49-F238E27FC236}">
+                <a16:creationId xmlns:a16="http://schemas.microsoft.com/office/drawing/2014/main" id="{DC76183D-B9E8-47AD-9873-66F08644F81E}"/>
+              </a:ext>
+            </a:extLst>
+          </p:cNvPr>
+          <p:cNvSpPr>
+            <a:spLocks noGrp="1"/>
+          </p:cNvSpPr>
+          <p:nvPr>
+            <p:ph idx="1"/>
+          </p:nvPr>
+        </p:nvSpPr>
+        <p:spPr/>
+        <p:txBody>
+          <a:bodyPr>
+            <a:normAutofit/>
+          </a:bodyPr>
+          <a:lstStyle/>
+          <a:p>
+            <a:r>
               <a:rPr lang="en-CA" dirty="0"/>
-              <a:t>Exercise 2: Find the voltage</a:t>
-            </a:r>
-          </a:p>
-        </p:txBody>
-      </p:sp>
-      <p:sp>
-        <p:nvSpPr>
-          <p:cNvPr id="3" name="Content Placeholder 2">
-            <a:extLst>
-              <a:ext uri="{FF2B5EF4-FFF2-40B4-BE49-F238E27FC236}">
-                <a16:creationId xmlns:a16="http://schemas.microsoft.com/office/drawing/2014/main" id="{5DBA1501-045C-4142-9E3E-057ACED25BB6}"/>
-              </a:ext>
-            </a:extLst>
-          </p:cNvPr>
-          <p:cNvSpPr>
-            <a:spLocks noGrp="1"/>
-          </p:cNvSpPr>
-          <p:nvPr>
-            <p:ph idx="1"/>
-          </p:nvPr>
-        </p:nvSpPr>
-        <p:spPr/>
-        <p:txBody>
-          <a:bodyPr/>
-          <a:lstStyle/>
-          <a:p>
+              <a:t>Resistors:</a:t>
+            </a:r>
+          </a:p>
+          <a:p>
+            <a:pPr lvl="1"/>
             <a:r>
               <a:rPr lang="en-CA" dirty="0"/>
-              <a:t>[Multiple simple R circuits w/ 1 resistor,  series, parallel, series + parallel]</a:t>
-            </a:r>
-          </a:p>
-        </p:txBody>
-      </p:sp>
+              <a:t>Series: Req = R1+R2</a:t>
+            </a:r>
+          </a:p>
+          <a:p>
+            <a:pPr lvl="1"/>
+            <a:r>
+              <a:rPr lang="en-CA" dirty="0"/>
+              <a:t>Parallel: Req = 1/(1/R1 + 1/R2)</a:t>
+            </a:r>
+          </a:p>
+          <a:p>
+            <a:r>
+              <a:rPr lang="en-CA" dirty="0"/>
+              <a:t>Capacitors:</a:t>
+            </a:r>
+          </a:p>
+          <a:p>
+            <a:pPr lvl="1"/>
+            <a:r>
+              <a:rPr lang="en-CA" dirty="0"/>
+              <a:t>Series: </a:t>
+            </a:r>
+            <a:r>
+              <a:rPr lang="en-CA" dirty="0" err="1"/>
+              <a:t>Ceq</a:t>
+            </a:r>
+            <a:r>
+              <a:rPr lang="en-CA" dirty="0"/>
+              <a:t> = 1/(1/C1 + 1/C2) </a:t>
+            </a:r>
+          </a:p>
+          <a:p>
+            <a:pPr lvl="1"/>
+            <a:r>
+              <a:rPr lang="en-CA" dirty="0"/>
+              <a:t>Parallel: </a:t>
+            </a:r>
+            <a:r>
+              <a:rPr lang="en-CA" dirty="0" err="1"/>
+              <a:t>Ceq</a:t>
+            </a:r>
+            <a:r>
+              <a:rPr lang="en-CA" dirty="0"/>
+              <a:t> = C1+C2</a:t>
+            </a:r>
+          </a:p>
+          <a:p>
+            <a:r>
+              <a:rPr lang="en-CA" dirty="0"/>
+              <a:t>Inductors:</a:t>
+            </a:r>
+          </a:p>
+          <a:p>
+            <a:pPr lvl="1"/>
+            <a:r>
+              <a:rPr lang="en-CA" dirty="0"/>
+              <a:t>Series: </a:t>
+            </a:r>
+            <a:r>
+              <a:rPr lang="en-CA" dirty="0" err="1"/>
+              <a:t>Leq</a:t>
+            </a:r>
+            <a:r>
+              <a:rPr lang="en-CA" dirty="0"/>
+              <a:t> = L1+L2</a:t>
+            </a:r>
+          </a:p>
+          <a:p>
+            <a:pPr lvl="1"/>
+            <a:r>
+              <a:rPr lang="en-CA" dirty="0"/>
+              <a:t>Parallel: </a:t>
+            </a:r>
+            <a:r>
+              <a:rPr lang="en-CA" dirty="0" err="1"/>
+              <a:t>Leq</a:t>
+            </a:r>
+            <a:r>
+              <a:rPr lang="en-CA" dirty="0"/>
+              <a:t> = 1/(1/L1 + 1/L2)</a:t>
+            </a:r>
+          </a:p>
+        </p:txBody>
+      </p:sp>
+      <p:pic>
+        <p:nvPicPr>
+          <p:cNvPr id="5" name="Picture 4" descr="A screenshot of a cell phone&#10;&#10;Description automatically generated">
+            <a:extLst>
+              <a:ext uri="{FF2B5EF4-FFF2-40B4-BE49-F238E27FC236}">
+                <a16:creationId xmlns:a16="http://schemas.microsoft.com/office/drawing/2014/main" id="{200C04C7-39B7-4BBA-96DA-4F999530C331}"/>
+              </a:ext>
+            </a:extLst>
+          </p:cNvPr>
+          <p:cNvPicPr>
+            <a:picLocks noChangeAspect="1"/>
+          </p:cNvPicPr>
+          <p:nvPr/>
+        </p:nvPicPr>
+        <p:blipFill>
+          <a:blip r:embed="rId2">
+            <a:extLst>
+              <a:ext uri="{28A0092B-C50C-407E-A947-70E740481C1C}">
+                <a14:useLocalDpi xmlns:a14="http://schemas.microsoft.com/office/drawing/2010/main" val="0"/>
+              </a:ext>
+            </a:extLst>
+          </a:blip>
+          <a:stretch>
+            <a:fillRect/>
+          </a:stretch>
+        </p:blipFill>
+        <p:spPr>
+          <a:xfrm>
+            <a:off x="5627077" y="2439826"/>
+            <a:ext cx="6233083" cy="3122936"/>
+          </a:xfrm>
+          <a:prstGeom prst="rect">
+            <a:avLst/>
+          </a:prstGeom>
+        </p:spPr>
+      </p:pic>
     </p:spTree>
     <p:extLst>
       <p:ext uri="{BB962C8B-B14F-4D97-AF65-F5344CB8AC3E}">
-        <p14:creationId xmlns:p14="http://schemas.microsoft.com/office/powerpoint/2010/main" val="2030826388"/>
+        <p14:creationId xmlns:p14="http://schemas.microsoft.com/office/powerpoint/2010/main" val="2135196795"/>
       </p:ext>
     </p:extLst>
   </p:cSld>
@@ -4252,7 +5119,7 @@
           <p:cNvPr id="2" name="Title 1">
             <a:extLst>
               <a:ext uri="{FF2B5EF4-FFF2-40B4-BE49-F238E27FC236}">
-                <a16:creationId xmlns:a16="http://schemas.microsoft.com/office/drawing/2014/main" id="{626B63E8-BC2B-417B-B484-FD03D55AC7A4}"/>
+                <a16:creationId xmlns:a16="http://schemas.microsoft.com/office/drawing/2014/main" id="{749F9C11-5F07-43E9-8569-3EBE4E00B03A}"/>
               </a:ext>
             </a:extLst>
           </p:cNvPr>
@@ -4270,7 +5137,7 @@
           <a:p>
             <a:r>
               <a:rPr lang="en-CA" dirty="0"/>
-              <a:t>When will I need to use this?</a:t>
+              <a:t>Exercise 1: Find the current</a:t>
             </a:r>
           </a:p>
         </p:txBody>
@@ -4280,7 +5147,7 @@
           <p:cNvPr id="3" name="Content Placeholder 2">
             <a:extLst>
               <a:ext uri="{FF2B5EF4-FFF2-40B4-BE49-F238E27FC236}">
-                <a16:creationId xmlns:a16="http://schemas.microsoft.com/office/drawing/2014/main" id="{A89D0808-2749-4E11-8462-B863E6302136}"/>
+                <a16:creationId xmlns:a16="http://schemas.microsoft.com/office/drawing/2014/main" id="{5DBA1501-045C-4142-9E3E-057ACED25BB6}"/>
               </a:ext>
             </a:extLst>
           </p:cNvPr>
@@ -4298,41 +5165,7 @@
           <a:p>
             <a:r>
               <a:rPr lang="en-CA" dirty="0"/>
-              <a:t>Ex: HC-05 Bluetooth module:</a:t>
-            </a:r>
-          </a:p>
-          <a:p>
-            <a:r>
-              <a:rPr lang="en-CA" dirty="0"/>
-              <a:t>The RX pin for this module is rated for 3.3V</a:t>
-            </a:r>
-          </a:p>
-          <a:p>
-            <a:pPr lvl="1"/>
-            <a:r>
-              <a:rPr lang="en-CA" dirty="0"/>
-              <a:t>The Arduino pins can only output 5V</a:t>
-            </a:r>
-          </a:p>
-          <a:p>
-            <a:pPr lvl="2"/>
-            <a:r>
-              <a:rPr lang="en-CA" dirty="0"/>
-              <a:t>Need a voltage divider to turn the 5V into 3.3V</a:t>
-            </a:r>
-          </a:p>
-          <a:p>
-            <a:pPr lvl="2"/>
-            <a:r>
-              <a:rPr lang="en-CA" dirty="0"/>
-              <a:t>[exercise: What resistor ratio would give us the right voltage at the RX pin?]</a:t>
-            </a:r>
-          </a:p>
-          <a:p>
-            <a:pPr lvl="2"/>
-            <a:r>
-              <a:rPr lang="en-CA" dirty="0"/>
-              <a:t>Link to the GitHub Voltage Divider page in Common Circuits</a:t>
+              <a:t>[Multiple simple R circuits w/ 1 resistor,  series, parallel, series + parallel]</a:t>
             </a:r>
           </a:p>
         </p:txBody>
@@ -4340,7 +5173,7 @@
     </p:spTree>
     <p:extLst>
       <p:ext uri="{BB962C8B-B14F-4D97-AF65-F5344CB8AC3E}">
-        <p14:creationId xmlns:p14="http://schemas.microsoft.com/office/powerpoint/2010/main" val="3246355353"/>
+        <p14:creationId xmlns:p14="http://schemas.microsoft.com/office/powerpoint/2010/main" val="1754141922"/>
       </p:ext>
     </p:extLst>
   </p:cSld>
@@ -4372,7 +5205,7 @@
           <p:cNvPr id="2" name="Title 1">
             <a:extLst>
               <a:ext uri="{FF2B5EF4-FFF2-40B4-BE49-F238E27FC236}">
-                <a16:creationId xmlns:a16="http://schemas.microsoft.com/office/drawing/2014/main" id="{2179302D-0941-48DE-B89D-EA55998FA9C7}"/>
+                <a16:creationId xmlns:a16="http://schemas.microsoft.com/office/drawing/2014/main" id="{749F9C11-5F07-43E9-8569-3EBE4E00B03A}"/>
               </a:ext>
             </a:extLst>
           </p:cNvPr>
@@ -4390,7 +5223,7 @@
           <a:p>
             <a:r>
               <a:rPr lang="en-CA" dirty="0"/>
-              <a:t>Useful component: Diodes</a:t>
+              <a:t>Exercise 2: Find the voltage</a:t>
             </a:r>
           </a:p>
         </p:txBody>
@@ -4400,7 +5233,7 @@
           <p:cNvPr id="3" name="Content Placeholder 2">
             <a:extLst>
               <a:ext uri="{FF2B5EF4-FFF2-40B4-BE49-F238E27FC236}">
-                <a16:creationId xmlns:a16="http://schemas.microsoft.com/office/drawing/2014/main" id="{12B7D4A2-8053-46E5-BE5B-AEA26E954312}"/>
+                <a16:creationId xmlns:a16="http://schemas.microsoft.com/office/drawing/2014/main" id="{5DBA1501-045C-4142-9E3E-057ACED25BB6}"/>
               </a:ext>
             </a:extLst>
           </p:cNvPr>
@@ -4418,65 +5251,7 @@
           <a:p>
             <a:r>
               <a:rPr lang="en-CA" dirty="0"/>
-              <a:t>One way valve: Allows current to travel freely in one direction, but not in the other</a:t>
-            </a:r>
-          </a:p>
-          <a:p>
-            <a:pPr lvl="1"/>
-            <a:r>
-              <a:rPr lang="en-CA" dirty="0"/>
-              <a:t>Used to protect circuit from connecting a power source backwards</a:t>
-            </a:r>
-          </a:p>
-          <a:p>
-            <a:pPr lvl="1"/>
-            <a:r>
-              <a:rPr lang="en-CA" dirty="0"/>
-              <a:t>Used to protect circuit from back EMF</a:t>
-            </a:r>
-          </a:p>
-          <a:p>
-            <a:pPr lvl="1"/>
-            <a:r>
-              <a:rPr lang="en-CA" dirty="0"/>
-              <a:t>Used to transform AC to DC (</a:t>
-            </a:r>
-            <a:r>
-              <a:rPr lang="en-CA" dirty="0" err="1"/>
-              <a:t>e.g</a:t>
-            </a:r>
-            <a:r>
-              <a:rPr lang="en-CA" dirty="0"/>
-              <a:t>: full bridge rectifier)</a:t>
-            </a:r>
-          </a:p>
-          <a:p>
-            <a:pPr lvl="1"/>
-            <a:r>
-              <a:rPr lang="en-CA" dirty="0"/>
-              <a:t>[insert image of diode]</a:t>
-            </a:r>
-          </a:p>
-          <a:p>
-            <a:pPr lvl="1"/>
-            <a:endParaRPr lang="en-CA" dirty="0"/>
-          </a:p>
-          <a:p>
-            <a:pPr lvl="1"/>
-            <a:endParaRPr lang="en-CA" dirty="0"/>
-          </a:p>
-          <a:p>
-            <a:pPr lvl="1"/>
-            <a:r>
-              <a:rPr lang="en-CA" dirty="0"/>
-              <a:t>There are different types.</a:t>
-            </a:r>
-          </a:p>
-          <a:p>
-            <a:pPr lvl="2"/>
-            <a:r>
-              <a:rPr lang="en-CA" dirty="0"/>
-              <a:t>Can find list on GitHub Common Circuits folder</a:t>
+              <a:t>[Multiple simple R circuits w/ 1 resistor,  series, parallel, series + parallel]</a:t>
             </a:r>
           </a:p>
         </p:txBody>
@@ -4484,7 +5259,7 @@
     </p:spTree>
     <p:extLst>
       <p:ext uri="{BB962C8B-B14F-4D97-AF65-F5344CB8AC3E}">
-        <p14:creationId xmlns:p14="http://schemas.microsoft.com/office/powerpoint/2010/main" val="438790139"/>
+        <p14:creationId xmlns:p14="http://schemas.microsoft.com/office/powerpoint/2010/main" val="2030826388"/>
       </p:ext>
     </p:extLst>
   </p:cSld>

</xml_diff>